<commit_message>
Updates to contact modeling
</commit_message>
<xml_diff>
--- a/figures/modeling/coordinates.pptx
+++ b/figures/modeling/coordinates.pptx
@@ -166,10 +166,9 @@
           </a:lstStyle>
           <a:p>
             <a:r>
-              <a:rPr lang="en-US" smtClean="0"/>
+              <a:rPr lang="en-US"/>
               <a:t>Click to edit Master title style</a:t>
             </a:r>
-            <a:endParaRPr lang="en-US"/>
           </a:p>
         </p:txBody>
       </p:sp>
@@ -231,10 +230,9 @@
           </a:lstStyle>
           <a:p>
             <a:r>
-              <a:rPr lang="en-US" smtClean="0"/>
+              <a:rPr lang="en-US"/>
               <a:t>Click to edit Master subtitle style</a:t>
             </a:r>
-            <a:endParaRPr lang="en-US"/>
           </a:p>
         </p:txBody>
       </p:sp>
@@ -255,7 +253,7 @@
           <a:p>
             <a:fld id="{1EED641A-0429-4468-8D85-FD6205A1EDF0}" type="datetimeFigureOut">
               <a:rPr lang="en-US" smtClean="0"/>
-              <a:t>9/3/2017</a:t>
+              <a:t>1/21/2021</a:t>
             </a:fld>
             <a:endParaRPr lang="en-US"/>
           </a:p>
@@ -349,10 +347,9 @@
           <a:lstStyle/>
           <a:p>
             <a:r>
-              <a:rPr lang="en-US" smtClean="0"/>
+              <a:rPr lang="en-US"/>
               <a:t>Click to edit Master title style</a:t>
             </a:r>
-            <a:endParaRPr lang="en-US"/>
           </a:p>
         </p:txBody>
       </p:sp>
@@ -373,38 +370,37 @@
           <a:p>
             <a:pPr lvl="0"/>
             <a:r>
-              <a:rPr lang="en-US" smtClean="0"/>
+              <a:rPr lang="en-US"/>
               <a:t>Edit Master text styles</a:t>
             </a:r>
           </a:p>
           <a:p>
             <a:pPr lvl="1"/>
             <a:r>
-              <a:rPr lang="en-US" smtClean="0"/>
+              <a:rPr lang="en-US"/>
               <a:t>Second level</a:t>
             </a:r>
           </a:p>
           <a:p>
             <a:pPr lvl="2"/>
             <a:r>
-              <a:rPr lang="en-US" smtClean="0"/>
+              <a:rPr lang="en-US"/>
               <a:t>Third level</a:t>
             </a:r>
           </a:p>
           <a:p>
             <a:pPr lvl="3"/>
             <a:r>
-              <a:rPr lang="en-US" smtClean="0"/>
+              <a:rPr lang="en-US"/>
               <a:t>Fourth level</a:t>
             </a:r>
           </a:p>
           <a:p>
             <a:pPr lvl="4"/>
             <a:r>
-              <a:rPr lang="en-US" smtClean="0"/>
+              <a:rPr lang="en-US"/>
               <a:t>Fifth level</a:t>
             </a:r>
-            <a:endParaRPr lang="en-US"/>
           </a:p>
         </p:txBody>
       </p:sp>
@@ -425,7 +421,7 @@
           <a:p>
             <a:fld id="{1EED641A-0429-4468-8D85-FD6205A1EDF0}" type="datetimeFigureOut">
               <a:rPr lang="en-US" smtClean="0"/>
-              <a:t>9/3/2017</a:t>
+              <a:t>1/21/2021</a:t>
             </a:fld>
             <a:endParaRPr lang="en-US"/>
           </a:p>
@@ -524,10 +520,9 @@
           <a:lstStyle/>
           <a:p>
             <a:r>
-              <a:rPr lang="en-US" smtClean="0"/>
+              <a:rPr lang="en-US"/>
               <a:t>Click to edit Master title style</a:t>
             </a:r>
-            <a:endParaRPr lang="en-US"/>
           </a:p>
         </p:txBody>
       </p:sp>
@@ -553,38 +548,37 @@
           <a:p>
             <a:pPr lvl="0"/>
             <a:r>
-              <a:rPr lang="en-US" smtClean="0"/>
+              <a:rPr lang="en-US"/>
               <a:t>Edit Master text styles</a:t>
             </a:r>
           </a:p>
           <a:p>
             <a:pPr lvl="1"/>
             <a:r>
-              <a:rPr lang="en-US" smtClean="0"/>
+              <a:rPr lang="en-US"/>
               <a:t>Second level</a:t>
             </a:r>
           </a:p>
           <a:p>
             <a:pPr lvl="2"/>
             <a:r>
-              <a:rPr lang="en-US" smtClean="0"/>
+              <a:rPr lang="en-US"/>
               <a:t>Third level</a:t>
             </a:r>
           </a:p>
           <a:p>
             <a:pPr lvl="3"/>
             <a:r>
-              <a:rPr lang="en-US" smtClean="0"/>
+              <a:rPr lang="en-US"/>
               <a:t>Fourth level</a:t>
             </a:r>
           </a:p>
           <a:p>
             <a:pPr lvl="4"/>
             <a:r>
-              <a:rPr lang="en-US" smtClean="0"/>
+              <a:rPr lang="en-US"/>
               <a:t>Fifth level</a:t>
             </a:r>
-            <a:endParaRPr lang="en-US"/>
           </a:p>
         </p:txBody>
       </p:sp>
@@ -605,7 +599,7 @@
           <a:p>
             <a:fld id="{1EED641A-0429-4468-8D85-FD6205A1EDF0}" type="datetimeFigureOut">
               <a:rPr lang="en-US" smtClean="0"/>
-              <a:t>9/3/2017</a:t>
+              <a:t>1/21/2021</a:t>
             </a:fld>
             <a:endParaRPr lang="en-US"/>
           </a:p>
@@ -699,10 +693,9 @@
           <a:lstStyle/>
           <a:p>
             <a:r>
-              <a:rPr lang="en-US" smtClean="0"/>
+              <a:rPr lang="en-US"/>
               <a:t>Click to edit Master title style</a:t>
             </a:r>
-            <a:endParaRPr lang="en-US"/>
           </a:p>
         </p:txBody>
       </p:sp>
@@ -723,38 +716,37 @@
           <a:p>
             <a:pPr lvl="0"/>
             <a:r>
-              <a:rPr lang="en-US" smtClean="0"/>
+              <a:rPr lang="en-US"/>
               <a:t>Edit Master text styles</a:t>
             </a:r>
           </a:p>
           <a:p>
             <a:pPr lvl="1"/>
             <a:r>
-              <a:rPr lang="en-US" smtClean="0"/>
+              <a:rPr lang="en-US"/>
               <a:t>Second level</a:t>
             </a:r>
           </a:p>
           <a:p>
             <a:pPr lvl="2"/>
             <a:r>
-              <a:rPr lang="en-US" smtClean="0"/>
+              <a:rPr lang="en-US"/>
               <a:t>Third level</a:t>
             </a:r>
           </a:p>
           <a:p>
             <a:pPr lvl="3"/>
             <a:r>
-              <a:rPr lang="en-US" smtClean="0"/>
+              <a:rPr lang="en-US"/>
               <a:t>Fourth level</a:t>
             </a:r>
           </a:p>
           <a:p>
             <a:pPr lvl="4"/>
             <a:r>
-              <a:rPr lang="en-US" smtClean="0"/>
+              <a:rPr lang="en-US"/>
               <a:t>Fifth level</a:t>
             </a:r>
-            <a:endParaRPr lang="en-US"/>
           </a:p>
         </p:txBody>
       </p:sp>
@@ -775,7 +767,7 @@
           <a:p>
             <a:fld id="{1EED641A-0429-4468-8D85-FD6205A1EDF0}" type="datetimeFigureOut">
               <a:rPr lang="en-US" smtClean="0"/>
-              <a:t>9/3/2017</a:t>
+              <a:t>1/21/2021</a:t>
             </a:fld>
             <a:endParaRPr lang="en-US"/>
           </a:p>
@@ -878,10 +870,9 @@
           </a:lstStyle>
           <a:p>
             <a:r>
-              <a:rPr lang="en-US" smtClean="0"/>
+              <a:rPr lang="en-US"/>
               <a:t>Click to edit Master title style</a:t>
             </a:r>
-            <a:endParaRPr lang="en-US"/>
           </a:p>
         </p:txBody>
       </p:sp>
@@ -998,7 +989,7 @@
           <a:p>
             <a:pPr lvl="0"/>
             <a:r>
-              <a:rPr lang="en-US" smtClean="0"/>
+              <a:rPr lang="en-US"/>
               <a:t>Edit Master text styles</a:t>
             </a:r>
           </a:p>
@@ -1021,7 +1012,7 @@
           <a:p>
             <a:fld id="{1EED641A-0429-4468-8D85-FD6205A1EDF0}" type="datetimeFigureOut">
               <a:rPr lang="en-US" smtClean="0"/>
-              <a:t>9/3/2017</a:t>
+              <a:t>1/21/2021</a:t>
             </a:fld>
             <a:endParaRPr lang="en-US"/>
           </a:p>
@@ -1115,10 +1106,9 @@
           <a:lstStyle/>
           <a:p>
             <a:r>
-              <a:rPr lang="en-US" smtClean="0"/>
+              <a:rPr lang="en-US"/>
               <a:t>Click to edit Master title style</a:t>
             </a:r>
-            <a:endParaRPr lang="en-US"/>
           </a:p>
         </p:txBody>
       </p:sp>
@@ -1144,38 +1134,37 @@
           <a:p>
             <a:pPr lvl="0"/>
             <a:r>
-              <a:rPr lang="en-US" smtClean="0"/>
+              <a:rPr lang="en-US"/>
               <a:t>Edit Master text styles</a:t>
             </a:r>
           </a:p>
           <a:p>
             <a:pPr lvl="1"/>
             <a:r>
-              <a:rPr lang="en-US" smtClean="0"/>
+              <a:rPr lang="en-US"/>
               <a:t>Second level</a:t>
             </a:r>
           </a:p>
           <a:p>
             <a:pPr lvl="2"/>
             <a:r>
-              <a:rPr lang="en-US" smtClean="0"/>
+              <a:rPr lang="en-US"/>
               <a:t>Third level</a:t>
             </a:r>
           </a:p>
           <a:p>
             <a:pPr lvl="3"/>
             <a:r>
-              <a:rPr lang="en-US" smtClean="0"/>
+              <a:rPr lang="en-US"/>
               <a:t>Fourth level</a:t>
             </a:r>
           </a:p>
           <a:p>
             <a:pPr lvl="4"/>
             <a:r>
-              <a:rPr lang="en-US" smtClean="0"/>
+              <a:rPr lang="en-US"/>
               <a:t>Fifth level</a:t>
             </a:r>
-            <a:endParaRPr lang="en-US"/>
           </a:p>
         </p:txBody>
       </p:sp>
@@ -1201,38 +1190,37 @@
           <a:p>
             <a:pPr lvl="0"/>
             <a:r>
-              <a:rPr lang="en-US" smtClean="0"/>
+              <a:rPr lang="en-US"/>
               <a:t>Edit Master text styles</a:t>
             </a:r>
           </a:p>
           <a:p>
             <a:pPr lvl="1"/>
             <a:r>
-              <a:rPr lang="en-US" smtClean="0"/>
+              <a:rPr lang="en-US"/>
               <a:t>Second level</a:t>
             </a:r>
           </a:p>
           <a:p>
             <a:pPr lvl="2"/>
             <a:r>
-              <a:rPr lang="en-US" smtClean="0"/>
+              <a:rPr lang="en-US"/>
               <a:t>Third level</a:t>
             </a:r>
           </a:p>
           <a:p>
             <a:pPr lvl="3"/>
             <a:r>
-              <a:rPr lang="en-US" smtClean="0"/>
+              <a:rPr lang="en-US"/>
               <a:t>Fourth level</a:t>
             </a:r>
           </a:p>
           <a:p>
             <a:pPr lvl="4"/>
             <a:r>
-              <a:rPr lang="en-US" smtClean="0"/>
+              <a:rPr lang="en-US"/>
               <a:t>Fifth level</a:t>
             </a:r>
-            <a:endParaRPr lang="en-US"/>
           </a:p>
         </p:txBody>
       </p:sp>
@@ -1253,7 +1241,7 @@
           <a:p>
             <a:fld id="{1EED641A-0429-4468-8D85-FD6205A1EDF0}" type="datetimeFigureOut">
               <a:rPr lang="en-US" smtClean="0"/>
-              <a:t>9/3/2017</a:t>
+              <a:t>1/21/2021</a:t>
             </a:fld>
             <a:endParaRPr lang="en-US"/>
           </a:p>
@@ -1352,10 +1340,9 @@
           <a:lstStyle/>
           <a:p>
             <a:r>
-              <a:rPr lang="en-US" smtClean="0"/>
+              <a:rPr lang="en-US"/>
               <a:t>Click to edit Master title style</a:t>
             </a:r>
-            <a:endParaRPr lang="en-US"/>
           </a:p>
         </p:txBody>
       </p:sp>
@@ -1418,7 +1405,7 @@
           <a:p>
             <a:pPr lvl="0"/>
             <a:r>
-              <a:rPr lang="en-US" smtClean="0"/>
+              <a:rPr lang="en-US"/>
               <a:t>Edit Master text styles</a:t>
             </a:r>
           </a:p>
@@ -1446,38 +1433,37 @@
           <a:p>
             <a:pPr lvl="0"/>
             <a:r>
-              <a:rPr lang="en-US" smtClean="0"/>
+              <a:rPr lang="en-US"/>
               <a:t>Edit Master text styles</a:t>
             </a:r>
           </a:p>
           <a:p>
             <a:pPr lvl="1"/>
             <a:r>
-              <a:rPr lang="en-US" smtClean="0"/>
+              <a:rPr lang="en-US"/>
               <a:t>Second level</a:t>
             </a:r>
           </a:p>
           <a:p>
             <a:pPr lvl="2"/>
             <a:r>
-              <a:rPr lang="en-US" smtClean="0"/>
+              <a:rPr lang="en-US"/>
               <a:t>Third level</a:t>
             </a:r>
           </a:p>
           <a:p>
             <a:pPr lvl="3"/>
             <a:r>
-              <a:rPr lang="en-US" smtClean="0"/>
+              <a:rPr lang="en-US"/>
               <a:t>Fourth level</a:t>
             </a:r>
           </a:p>
           <a:p>
             <a:pPr lvl="4"/>
             <a:r>
-              <a:rPr lang="en-US" smtClean="0"/>
+              <a:rPr lang="en-US"/>
               <a:t>Fifth level</a:t>
             </a:r>
-            <a:endParaRPr lang="en-US"/>
           </a:p>
         </p:txBody>
       </p:sp>
@@ -1540,7 +1526,7 @@
           <a:p>
             <a:pPr lvl="0"/>
             <a:r>
-              <a:rPr lang="en-US" smtClean="0"/>
+              <a:rPr lang="en-US"/>
               <a:t>Edit Master text styles</a:t>
             </a:r>
           </a:p>
@@ -1568,38 +1554,37 @@
           <a:p>
             <a:pPr lvl="0"/>
             <a:r>
-              <a:rPr lang="en-US" smtClean="0"/>
+              <a:rPr lang="en-US"/>
               <a:t>Edit Master text styles</a:t>
             </a:r>
           </a:p>
           <a:p>
             <a:pPr lvl="1"/>
             <a:r>
-              <a:rPr lang="en-US" smtClean="0"/>
+              <a:rPr lang="en-US"/>
               <a:t>Second level</a:t>
             </a:r>
           </a:p>
           <a:p>
             <a:pPr lvl="2"/>
             <a:r>
-              <a:rPr lang="en-US" smtClean="0"/>
+              <a:rPr lang="en-US"/>
               <a:t>Third level</a:t>
             </a:r>
           </a:p>
           <a:p>
             <a:pPr lvl="3"/>
             <a:r>
-              <a:rPr lang="en-US" smtClean="0"/>
+              <a:rPr lang="en-US"/>
               <a:t>Fourth level</a:t>
             </a:r>
           </a:p>
           <a:p>
             <a:pPr lvl="4"/>
             <a:r>
-              <a:rPr lang="en-US" smtClean="0"/>
+              <a:rPr lang="en-US"/>
               <a:t>Fifth level</a:t>
             </a:r>
-            <a:endParaRPr lang="en-US"/>
           </a:p>
         </p:txBody>
       </p:sp>
@@ -1620,7 +1605,7 @@
           <a:p>
             <a:fld id="{1EED641A-0429-4468-8D85-FD6205A1EDF0}" type="datetimeFigureOut">
               <a:rPr lang="en-US" smtClean="0"/>
-              <a:t>9/3/2017</a:t>
+              <a:t>1/21/2021</a:t>
             </a:fld>
             <a:endParaRPr lang="en-US"/>
           </a:p>
@@ -1714,10 +1699,9 @@
           <a:lstStyle/>
           <a:p>
             <a:r>
-              <a:rPr lang="en-US" smtClean="0"/>
+              <a:rPr lang="en-US"/>
               <a:t>Click to edit Master title style</a:t>
             </a:r>
-            <a:endParaRPr lang="en-US"/>
           </a:p>
         </p:txBody>
       </p:sp>
@@ -1738,7 +1722,7 @@
           <a:p>
             <a:fld id="{1EED641A-0429-4468-8D85-FD6205A1EDF0}" type="datetimeFigureOut">
               <a:rPr lang="en-US" smtClean="0"/>
-              <a:t>9/3/2017</a:t>
+              <a:t>1/21/2021</a:t>
             </a:fld>
             <a:endParaRPr lang="en-US"/>
           </a:p>
@@ -1833,7 +1817,7 @@
           <a:p>
             <a:fld id="{1EED641A-0429-4468-8D85-FD6205A1EDF0}" type="datetimeFigureOut">
               <a:rPr lang="en-US" smtClean="0"/>
-              <a:t>9/3/2017</a:t>
+              <a:t>1/21/2021</a:t>
             </a:fld>
             <a:endParaRPr lang="en-US"/>
           </a:p>
@@ -1936,10 +1920,9 @@
           </a:lstStyle>
           <a:p>
             <a:r>
-              <a:rPr lang="en-US" smtClean="0"/>
+              <a:rPr lang="en-US"/>
               <a:t>Click to edit Master title style</a:t>
             </a:r>
-            <a:endParaRPr lang="en-US"/>
           </a:p>
         </p:txBody>
       </p:sp>
@@ -1993,38 +1976,37 @@
           <a:p>
             <a:pPr lvl="0"/>
             <a:r>
-              <a:rPr lang="en-US" smtClean="0"/>
+              <a:rPr lang="en-US"/>
               <a:t>Edit Master text styles</a:t>
             </a:r>
           </a:p>
           <a:p>
             <a:pPr lvl="1"/>
             <a:r>
-              <a:rPr lang="en-US" smtClean="0"/>
+              <a:rPr lang="en-US"/>
               <a:t>Second level</a:t>
             </a:r>
           </a:p>
           <a:p>
             <a:pPr lvl="2"/>
             <a:r>
-              <a:rPr lang="en-US" smtClean="0"/>
+              <a:rPr lang="en-US"/>
               <a:t>Third level</a:t>
             </a:r>
           </a:p>
           <a:p>
             <a:pPr lvl="3"/>
             <a:r>
-              <a:rPr lang="en-US" smtClean="0"/>
+              <a:rPr lang="en-US"/>
               <a:t>Fourth level</a:t>
             </a:r>
           </a:p>
           <a:p>
             <a:pPr lvl="4"/>
             <a:r>
-              <a:rPr lang="en-US" smtClean="0"/>
+              <a:rPr lang="en-US"/>
               <a:t>Fifth level</a:t>
             </a:r>
-            <a:endParaRPr lang="en-US"/>
           </a:p>
         </p:txBody>
       </p:sp>
@@ -2087,7 +2069,7 @@
           <a:p>
             <a:pPr lvl="0"/>
             <a:r>
-              <a:rPr lang="en-US" smtClean="0"/>
+              <a:rPr lang="en-US"/>
               <a:t>Edit Master text styles</a:t>
             </a:r>
           </a:p>
@@ -2110,7 +2092,7 @@
           <a:p>
             <a:fld id="{1EED641A-0429-4468-8D85-FD6205A1EDF0}" type="datetimeFigureOut">
               <a:rPr lang="en-US" smtClean="0"/>
-              <a:t>9/3/2017</a:t>
+              <a:t>1/21/2021</a:t>
             </a:fld>
             <a:endParaRPr lang="en-US"/>
           </a:p>
@@ -2213,10 +2195,9 @@
           </a:lstStyle>
           <a:p>
             <a:r>
-              <a:rPr lang="en-US" smtClean="0"/>
+              <a:rPr lang="en-US"/>
               <a:t>Click to edit Master title style</a:t>
             </a:r>
-            <a:endParaRPr lang="en-US"/>
           </a:p>
         </p:txBody>
       </p:sp>
@@ -2340,7 +2321,7 @@
           <a:p>
             <a:pPr lvl="0"/>
             <a:r>
-              <a:rPr lang="en-US" smtClean="0"/>
+              <a:rPr lang="en-US"/>
               <a:t>Edit Master text styles</a:t>
             </a:r>
           </a:p>
@@ -2363,7 +2344,7 @@
           <a:p>
             <a:fld id="{1EED641A-0429-4468-8D85-FD6205A1EDF0}" type="datetimeFigureOut">
               <a:rPr lang="en-US" smtClean="0"/>
-              <a:t>9/3/2017</a:t>
+              <a:t>1/21/2021</a:t>
             </a:fld>
             <a:endParaRPr lang="en-US"/>
           </a:p>
@@ -2472,10 +2453,9 @@
           <a:lstStyle/>
           <a:p>
             <a:r>
-              <a:rPr lang="en-US" smtClean="0"/>
+              <a:rPr lang="en-US"/>
               <a:t>Click to edit Master title style</a:t>
             </a:r>
-            <a:endParaRPr lang="en-US"/>
           </a:p>
         </p:txBody>
       </p:sp>
@@ -2506,38 +2486,37 @@
           <a:p>
             <a:pPr lvl="0"/>
             <a:r>
-              <a:rPr lang="en-US" smtClean="0"/>
+              <a:rPr lang="en-US"/>
               <a:t>Edit Master text styles</a:t>
             </a:r>
           </a:p>
           <a:p>
             <a:pPr lvl="1"/>
             <a:r>
-              <a:rPr lang="en-US" smtClean="0"/>
+              <a:rPr lang="en-US"/>
               <a:t>Second level</a:t>
             </a:r>
           </a:p>
           <a:p>
             <a:pPr lvl="2"/>
             <a:r>
-              <a:rPr lang="en-US" smtClean="0"/>
+              <a:rPr lang="en-US"/>
               <a:t>Third level</a:t>
             </a:r>
           </a:p>
           <a:p>
             <a:pPr lvl="3"/>
             <a:r>
-              <a:rPr lang="en-US" smtClean="0"/>
+              <a:rPr lang="en-US"/>
               <a:t>Fourth level</a:t>
             </a:r>
           </a:p>
           <a:p>
             <a:pPr lvl="4"/>
             <a:r>
-              <a:rPr lang="en-US" smtClean="0"/>
+              <a:rPr lang="en-US"/>
               <a:t>Fifth level</a:t>
             </a:r>
-            <a:endParaRPr lang="en-US"/>
           </a:p>
         </p:txBody>
       </p:sp>
@@ -2576,7 +2555,7 @@
           <a:p>
             <a:fld id="{1EED641A-0429-4468-8D85-FD6205A1EDF0}" type="datetimeFigureOut">
               <a:rPr lang="en-US" smtClean="0"/>
-              <a:t>9/3/2017</a:t>
+              <a:t>1/21/2021</a:t>
             </a:fld>
             <a:endParaRPr lang="en-US"/>
           </a:p>
@@ -3204,16 +3183,12 @@
           <a:lstStyle/>
           <a:p>
             <a:r>
-              <a:rPr lang="en-US" i="1" dirty="0" smtClean="0">
+              <a:rPr lang="en-US" i="1" dirty="0">
                 <a:latin typeface="Times New Roman" panose="02020603050405020304" pitchFamily="18" charset="0"/>
                 <a:cs typeface="Times New Roman" panose="02020603050405020304" pitchFamily="18" charset="0"/>
               </a:rPr>
               <a:t>P</a:t>
             </a:r>
-            <a:endParaRPr lang="en-US" i="1" dirty="0">
-              <a:latin typeface="Times New Roman" panose="02020603050405020304" pitchFamily="18" charset="0"/>
-              <a:cs typeface="Times New Roman" panose="02020603050405020304" pitchFamily="18" charset="0"/>
-            </a:endParaRPr>
           </a:p>
         </p:txBody>
       </p:sp>
@@ -3240,16 +3215,12 @@
           <a:lstStyle/>
           <a:p>
             <a:r>
-              <a:rPr lang="en-US" i="1" dirty="0" smtClean="0">
+              <a:rPr lang="en-US" i="1" dirty="0">
                 <a:latin typeface="Times New Roman" panose="02020603050405020304" pitchFamily="18" charset="0"/>
                 <a:cs typeface="Times New Roman" panose="02020603050405020304" pitchFamily="18" charset="0"/>
               </a:rPr>
               <a:t>P</a:t>
             </a:r>
-            <a:endParaRPr lang="en-US" i="1" dirty="0">
-              <a:latin typeface="Times New Roman" panose="02020603050405020304" pitchFamily="18" charset="0"/>
-              <a:cs typeface="Times New Roman" panose="02020603050405020304" pitchFamily="18" charset="0"/>
-            </a:endParaRPr>
           </a:p>
         </p:txBody>
       </p:sp>
@@ -3276,16 +3247,12 @@
           <a:lstStyle/>
           <a:p>
             <a:r>
-              <a:rPr lang="en-US" i="1" dirty="0" smtClean="0">
+              <a:rPr lang="en-US" i="1" dirty="0">
                 <a:latin typeface="Times New Roman" panose="02020603050405020304" pitchFamily="18" charset="0"/>
                 <a:cs typeface="Times New Roman" panose="02020603050405020304" pitchFamily="18" charset="0"/>
               </a:rPr>
               <a:t>O</a:t>
             </a:r>
-            <a:endParaRPr lang="en-US" i="1" dirty="0">
-              <a:latin typeface="Times New Roman" panose="02020603050405020304" pitchFamily="18" charset="0"/>
-              <a:cs typeface="Times New Roman" panose="02020603050405020304" pitchFamily="18" charset="0"/>
-            </a:endParaRPr>
           </a:p>
         </p:txBody>
       </p:sp>
@@ -3312,16 +3279,12 @@
           <a:lstStyle/>
           <a:p>
             <a:r>
-              <a:rPr lang="en-US" i="1" dirty="0" smtClean="0">
+              <a:rPr lang="en-US" i="1" dirty="0">
                 <a:latin typeface="Times New Roman" panose="02020603050405020304" pitchFamily="18" charset="0"/>
                 <a:cs typeface="Times New Roman" panose="02020603050405020304" pitchFamily="18" charset="0"/>
               </a:rPr>
               <a:t>X</a:t>
             </a:r>
-            <a:endParaRPr lang="en-US" i="1" dirty="0">
-              <a:latin typeface="Times New Roman" panose="02020603050405020304" pitchFamily="18" charset="0"/>
-              <a:cs typeface="Times New Roman" panose="02020603050405020304" pitchFamily="18" charset="0"/>
-            </a:endParaRPr>
           </a:p>
         </p:txBody>
       </p:sp>
@@ -3348,16 +3311,12 @@
           <a:lstStyle/>
           <a:p>
             <a:r>
-              <a:rPr lang="en-US" i="1" dirty="0" smtClean="0">
+              <a:rPr lang="en-US" i="1" dirty="0">
                 <a:latin typeface="Times New Roman" panose="02020603050405020304" pitchFamily="18" charset="0"/>
                 <a:cs typeface="Times New Roman" panose="02020603050405020304" pitchFamily="18" charset="0"/>
               </a:rPr>
               <a:t>Y</a:t>
             </a:r>
-            <a:endParaRPr lang="en-US" i="1" dirty="0">
-              <a:latin typeface="Times New Roman" panose="02020603050405020304" pitchFamily="18" charset="0"/>
-              <a:cs typeface="Times New Roman" panose="02020603050405020304" pitchFamily="18" charset="0"/>
-            </a:endParaRPr>
           </a:p>
         </p:txBody>
       </p:sp>
@@ -3384,16 +3343,12 @@
           <a:lstStyle/>
           <a:p>
             <a:r>
-              <a:rPr lang="en-US" dirty="0" smtClean="0">
+              <a:rPr lang="en-US" dirty="0">
                 <a:latin typeface="Times New Roman" panose="02020603050405020304" pitchFamily="18" charset="0"/>
                 <a:cs typeface="Times New Roman" panose="02020603050405020304" pitchFamily="18" charset="0"/>
               </a:rPr>
               <a:t>(a)</a:t>
             </a:r>
-            <a:endParaRPr lang="en-US" dirty="0">
-              <a:latin typeface="Times New Roman" panose="02020603050405020304" pitchFamily="18" charset="0"/>
-              <a:cs typeface="Times New Roman" panose="02020603050405020304" pitchFamily="18" charset="0"/>
-            </a:endParaRPr>
           </a:p>
         </p:txBody>
       </p:sp>
@@ -3420,16 +3375,12 @@
           <a:lstStyle/>
           <a:p>
             <a:r>
-              <a:rPr lang="en-US" dirty="0" smtClean="0">
+              <a:rPr lang="en-US" dirty="0">
                 <a:latin typeface="Times New Roman" panose="02020603050405020304" pitchFamily="18" charset="0"/>
                 <a:cs typeface="Times New Roman" panose="02020603050405020304" pitchFamily="18" charset="0"/>
               </a:rPr>
               <a:t>(b)</a:t>
             </a:r>
-            <a:endParaRPr lang="en-US" dirty="0">
-              <a:latin typeface="Times New Roman" panose="02020603050405020304" pitchFamily="18" charset="0"/>
-              <a:cs typeface="Times New Roman" panose="02020603050405020304" pitchFamily="18" charset="0"/>
-            </a:endParaRPr>
           </a:p>
         </p:txBody>
       </p:sp>
@@ -3616,16 +3567,12 @@
           <a:lstStyle/>
           <a:p>
             <a:r>
-              <a:rPr lang="en-US" i="1" smtClean="0">
+              <a:rPr lang="en-US" i="1">
                 <a:latin typeface="Times New Roman" panose="02020603050405020304" pitchFamily="18" charset="0"/>
                 <a:cs typeface="Times New Roman" panose="02020603050405020304" pitchFamily="18" charset="0"/>
               </a:rPr>
               <a:t>P</a:t>
             </a:r>
-            <a:endParaRPr lang="en-US" i="1">
-              <a:latin typeface="Times New Roman" panose="02020603050405020304" pitchFamily="18" charset="0"/>
-              <a:cs typeface="Times New Roman" panose="02020603050405020304" pitchFamily="18" charset="0"/>
-            </a:endParaRPr>
           </a:p>
         </p:txBody>
       </p:sp>
@@ -3652,16 +3599,12 @@
           <a:lstStyle/>
           <a:p>
             <a:r>
-              <a:rPr lang="en-US" i="1" dirty="0" smtClean="0">
+              <a:rPr lang="en-US" i="1" dirty="0">
                 <a:latin typeface="Times New Roman" panose="02020603050405020304" pitchFamily="18" charset="0"/>
                 <a:cs typeface="Times New Roman" panose="02020603050405020304" pitchFamily="18" charset="0"/>
               </a:rPr>
               <a:t>O</a:t>
             </a:r>
-            <a:endParaRPr lang="en-US" i="1" dirty="0">
-              <a:latin typeface="Times New Roman" panose="02020603050405020304" pitchFamily="18" charset="0"/>
-              <a:cs typeface="Times New Roman" panose="02020603050405020304" pitchFamily="18" charset="0"/>
-            </a:endParaRPr>
           </a:p>
         </p:txBody>
       </p:sp>
@@ -3688,16 +3631,12 @@
           <a:lstStyle/>
           <a:p>
             <a:r>
-              <a:rPr lang="en-US" i="1" dirty="0" smtClean="0">
+              <a:rPr lang="en-US" i="1" dirty="0">
                 <a:latin typeface="Times New Roman" panose="02020603050405020304" pitchFamily="18" charset="0"/>
                 <a:cs typeface="Times New Roman" panose="02020603050405020304" pitchFamily="18" charset="0"/>
               </a:rPr>
               <a:t>X</a:t>
             </a:r>
-            <a:endParaRPr lang="en-US" i="1" dirty="0">
-              <a:latin typeface="Times New Roman" panose="02020603050405020304" pitchFamily="18" charset="0"/>
-              <a:cs typeface="Times New Roman" panose="02020603050405020304" pitchFamily="18" charset="0"/>
-            </a:endParaRPr>
           </a:p>
         </p:txBody>
       </p:sp>
@@ -3724,16 +3663,12 @@
           <a:lstStyle/>
           <a:p>
             <a:r>
-              <a:rPr lang="en-US" i="1" dirty="0" smtClean="0">
+              <a:rPr lang="en-US" i="1" dirty="0">
                 <a:latin typeface="Times New Roman" panose="02020603050405020304" pitchFamily="18" charset="0"/>
                 <a:cs typeface="Times New Roman" panose="02020603050405020304" pitchFamily="18" charset="0"/>
               </a:rPr>
               <a:t>Y</a:t>
             </a:r>
-            <a:endParaRPr lang="en-US" i="1" dirty="0">
-              <a:latin typeface="Times New Roman" panose="02020603050405020304" pitchFamily="18" charset="0"/>
-              <a:cs typeface="Times New Roman" panose="02020603050405020304" pitchFamily="18" charset="0"/>
-            </a:endParaRPr>
           </a:p>
         </p:txBody>
       </p:sp>
@@ -3760,16 +3695,12 @@
           <a:lstStyle/>
           <a:p>
             <a:r>
-              <a:rPr lang="en-US" dirty="0" smtClean="0">
+              <a:rPr lang="en-US" dirty="0">
                 <a:latin typeface="Times New Roman" panose="02020603050405020304" pitchFamily="18" charset="0"/>
                 <a:cs typeface="Times New Roman" panose="02020603050405020304" pitchFamily="18" charset="0"/>
               </a:rPr>
               <a:t>(c)</a:t>
             </a:r>
-            <a:endParaRPr lang="en-US" dirty="0">
-              <a:latin typeface="Times New Roman" panose="02020603050405020304" pitchFamily="18" charset="0"/>
-              <a:cs typeface="Times New Roman" panose="02020603050405020304" pitchFamily="18" charset="0"/>
-            </a:endParaRPr>
           </a:p>
         </p:txBody>
       </p:sp>
@@ -3957,7 +3888,7 @@
                     </m:oMath>
                   </m:oMathPara>
                 </a14:m>
-                <a:endParaRPr lang="en-US" b="0" i="1" dirty="0" smtClean="0">
+                <a:endParaRPr lang="en-US" b="0" i="1" dirty="0">
                   <a:latin typeface="Times New Roman" panose="02020603050405020304" pitchFamily="18" charset="0"/>
                   <a:cs typeface="Times New Roman" panose="02020603050405020304" pitchFamily="18" charset="0"/>
                 </a:endParaRPr>
@@ -6526,7 +6457,7 @@
                     </m:oMath>
                   </m:oMathPara>
                 </a14:m>
-                <a:endParaRPr lang="en-US" b="0" dirty="0" smtClean="0"/>
+                <a:endParaRPr lang="en-US" b="0" dirty="0"/>
               </a:p>
             </p:txBody>
           </p:sp>
@@ -6629,7 +6560,7 @@
                     </m:oMath>
                   </m:oMathPara>
                 </a14:m>
-                <a:endParaRPr lang="en-US" b="0" dirty="0" smtClean="0"/>
+                <a:endParaRPr lang="en-US" b="0" dirty="0"/>
               </a:p>
             </p:txBody>
           </p:sp>
@@ -7766,12 +7697,8 @@
                     </m:oMath>
                   </m:oMathPara>
                 </a14:m>
-                <a:r>
-                  <a:rPr lang="en-US" b="0" dirty="0" smtClean="0"/>
-                  <a:t/>
-                </a:r>
                 <a:br>
-                  <a:rPr lang="en-US" b="0" dirty="0" smtClean="0"/>
+                  <a:rPr lang="en-US" b="0" dirty="0"/>
                 </a:br>
                 <a:endParaRPr lang="en-US" dirty="0"/>
               </a:p>
@@ -7857,13 +7784,8 @@
             </a:r>
             <a:r>
               <a:rPr lang="en-US" dirty="0"/>
-              <a:t> Z</a:t>
+              <a:t> Z)</a:t>
             </a:r>
-            <a:r>
-              <a:rPr lang="en-US" dirty="0" smtClean="0"/>
-              <a:t>)</a:t>
-            </a:r>
-            <a:endParaRPr lang="en-US" dirty="0"/>
           </a:p>
         </p:txBody>
       </p:sp>
@@ -7891,13 +7813,8 @@
           <a:p>
             <a:r>
               <a:rPr lang="en-US" dirty="0"/>
-              <a:t>(about X</a:t>
+              <a:t>(about X)</a:t>
             </a:r>
-            <a:r>
-              <a:rPr lang="en-US" dirty="0" smtClean="0"/>
-              <a:t>)</a:t>
-            </a:r>
-            <a:endParaRPr lang="en-US" dirty="0"/>
           </a:p>
         </p:txBody>
       </p:sp>
@@ -7925,13 +7842,8 @@
           <a:p>
             <a:r>
               <a:rPr lang="en-US" dirty="0"/>
-              <a:t>(about </a:t>
+              <a:t>(about Z)</a:t>
             </a:r>
-            <a:r>
-              <a:rPr lang="en-US" dirty="0" smtClean="0"/>
-              <a:t>Z)</a:t>
-            </a:r>
-            <a:endParaRPr lang="en-US" dirty="0"/>
           </a:p>
         </p:txBody>
       </p:sp>
@@ -8161,6 +8073,49 @@
           <a:chExt cx="0" cy="0"/>
         </a:xfrm>
       </p:grpSpPr>
+      <p:cxnSp>
+        <p:nvCxnSpPr>
+          <p:cNvPr id="64" name="Straight Arrow Connector 63">
+            <a:extLst>
+              <a:ext uri="{FF2B5EF4-FFF2-40B4-BE49-F238E27FC236}">
+                <a16:creationId xmlns:a16="http://schemas.microsoft.com/office/drawing/2014/main" id="{E2B87E36-A546-4763-924A-117F072C1F6E}"/>
+              </a:ext>
+            </a:extLst>
+          </p:cNvPr>
+          <p:cNvCxnSpPr/>
+          <p:nvPr/>
+        </p:nvCxnSpPr>
+        <p:spPr>
+          <a:xfrm flipV="1">
+            <a:off x="4779441" y="3427604"/>
+            <a:ext cx="0" cy="1062182"/>
+          </a:xfrm>
+          <a:prstGeom prst="straightConnector1">
+            <a:avLst/>
+          </a:prstGeom>
+          <a:ln w="12700">
+            <a:solidFill>
+              <a:schemeClr val="tx1"/>
+            </a:solidFill>
+            <a:prstDash val="dash"/>
+            <a:tailEnd type="triangle"/>
+          </a:ln>
+        </p:spPr>
+        <p:style>
+          <a:lnRef idx="1">
+            <a:schemeClr val="accent1"/>
+          </a:lnRef>
+          <a:fillRef idx="0">
+            <a:schemeClr val="accent1"/>
+          </a:fillRef>
+          <a:effectRef idx="0">
+            <a:schemeClr val="accent1"/>
+          </a:effectRef>
+          <a:fontRef idx="minor">
+            <a:schemeClr val="tx1"/>
+          </a:fontRef>
+        </p:style>
+      </p:cxnSp>
       <p:sp>
         <p:nvSpPr>
           <p:cNvPr id="7" name="Freeform 6"/>
@@ -8169,7 +8124,7 @@
         </p:nvSpPr>
         <p:spPr>
           <a:xfrm>
-            <a:off x="119304" y="3032067"/>
+            <a:off x="119304" y="3367618"/>
             <a:ext cx="3962400" cy="960582"/>
           </a:xfrm>
           <a:custGeom>
@@ -8301,7 +8256,7 @@
         </p:nvCxnSpPr>
         <p:spPr>
           <a:xfrm flipV="1">
-            <a:off x="2068176" y="2450176"/>
+            <a:off x="2068176" y="2785727"/>
             <a:ext cx="0" cy="1062182"/>
           </a:xfrm>
           <a:prstGeom prst="straightConnector1">
@@ -8309,7 +8264,9 @@
           </a:prstGeom>
           <a:ln w="28575">
             <a:solidFill>
-              <a:schemeClr val="tx1"/>
+              <a:schemeClr val="accent1">
+                <a:lumMod val="50000"/>
+              </a:schemeClr>
             </a:solidFill>
             <a:tailEnd type="triangle"/>
           </a:ln>
@@ -8337,7 +8294,7 @@
         </p:nvSpPr>
         <p:spPr>
           <a:xfrm>
-            <a:off x="2068176" y="2265510"/>
+            <a:off x="2068176" y="2601061"/>
             <a:ext cx="443345" cy="369332"/>
           </a:xfrm>
           <a:prstGeom prst="rect">
@@ -8366,7 +8323,7 @@
         </p:nvSpPr>
         <p:spPr>
           <a:xfrm>
-            <a:off x="3162685" y="3226092"/>
+            <a:off x="3162685" y="3561643"/>
             <a:ext cx="443345" cy="369332"/>
           </a:xfrm>
           <a:prstGeom prst="rect">
@@ -8381,10 +8338,9 @@
           <a:lstStyle/>
           <a:p>
             <a:r>
-              <a:rPr lang="en-US" dirty="0" smtClean="0"/>
+              <a:rPr lang="en-US" dirty="0"/>
               <a:t>X</a:t>
             </a:r>
-            <a:endParaRPr lang="en-US" dirty="0"/>
           </a:p>
         </p:txBody>
       </p:sp>
@@ -8396,7 +8352,7 @@
         </p:nvCxnSpPr>
         <p:spPr>
           <a:xfrm rot="5400000" flipV="1">
-            <a:off x="2599267" y="2981267"/>
+            <a:off x="2599267" y="3316818"/>
             <a:ext cx="0" cy="1062182"/>
           </a:xfrm>
           <a:prstGeom prst="straightConnector1">
@@ -8404,7 +8360,7 @@
           </a:prstGeom>
           <a:ln w="28575">
             <a:solidFill>
-              <a:schemeClr val="tx1"/>
+              <a:srgbClr val="C00000"/>
             </a:solidFill>
             <a:tailEnd type="triangle"/>
           </a:ln>
@@ -8432,7 +8388,7 @@
         </p:nvCxnSpPr>
         <p:spPr>
           <a:xfrm flipV="1">
-            <a:off x="2068176" y="3115194"/>
+            <a:off x="2068176" y="3450745"/>
             <a:ext cx="581891" cy="397164"/>
           </a:xfrm>
           <a:prstGeom prst="straightConnector1">
@@ -8440,7 +8396,9 @@
           </a:prstGeom>
           <a:ln w="28575">
             <a:solidFill>
-              <a:schemeClr val="tx1"/>
+              <a:schemeClr val="accent6">
+                <a:lumMod val="50000"/>
+              </a:schemeClr>
             </a:solidFill>
             <a:tailEnd type="triangle"/>
           </a:ln>
@@ -8468,7 +8426,7 @@
         </p:nvSpPr>
         <p:spPr>
           <a:xfrm>
-            <a:off x="2687013" y="2759747"/>
+            <a:off x="2687013" y="3095298"/>
             <a:ext cx="443345" cy="369332"/>
           </a:xfrm>
           <a:prstGeom prst="rect">
@@ -8483,10 +8441,9 @@
           <a:lstStyle/>
           <a:p>
             <a:r>
-              <a:rPr lang="en-US" dirty="0" smtClean="0"/>
+              <a:rPr lang="en-US" dirty="0"/>
               <a:t>Y</a:t>
             </a:r>
-            <a:endParaRPr lang="en-US" dirty="0"/>
           </a:p>
         </p:txBody>
       </p:sp>
@@ -8498,7 +8455,7 @@
         </p:nvSpPr>
         <p:spPr>
           <a:xfrm rot="18082971" flipH="1">
-            <a:off x="1735309" y="2850808"/>
+            <a:off x="1735309" y="3186359"/>
             <a:ext cx="272037" cy="120457"/>
           </a:xfrm>
           <a:custGeom>
@@ -8676,15 +8633,15 @@
         </p:spPr>
         <p:style>
           <a:lnRef idx="2">
-            <a:schemeClr val="accent1">
+            <a:schemeClr val="accent4">
               <a:shade val="50000"/>
             </a:schemeClr>
           </a:lnRef>
           <a:fillRef idx="1">
-            <a:schemeClr val="accent1"/>
+            <a:schemeClr val="accent4"/>
           </a:fillRef>
           <a:effectRef idx="0">
-            <a:schemeClr val="accent1"/>
+            <a:schemeClr val="accent4"/>
           </a:effectRef>
           <a:fontRef idx="minor">
             <a:schemeClr val="lt1"/>
@@ -8707,7 +8664,7 @@
         </p:nvSpPr>
         <p:spPr>
           <a:xfrm rot="18838023" flipH="1">
-            <a:off x="988992" y="2416097"/>
+            <a:off x="988992" y="2751648"/>
             <a:ext cx="794832" cy="315085"/>
           </a:xfrm>
           <a:custGeom>
@@ -9089,15 +9046,15 @@
         </p:spPr>
         <p:style>
           <a:lnRef idx="2">
-            <a:schemeClr val="accent1">
+            <a:schemeClr val="accent4">
               <a:shade val="50000"/>
             </a:schemeClr>
           </a:lnRef>
           <a:fillRef idx="1">
-            <a:schemeClr val="accent1"/>
+            <a:schemeClr val="accent4"/>
           </a:fillRef>
           <a:effectRef idx="0">
-            <a:schemeClr val="accent1"/>
+            <a:schemeClr val="accent4"/>
           </a:effectRef>
           <a:fontRef idx="minor">
             <a:schemeClr val="lt1"/>
@@ -9120,7 +9077,7 @@
         </p:nvSpPr>
         <p:spPr>
           <a:xfrm>
-            <a:off x="1927039" y="2653055"/>
+            <a:off x="1927039" y="2988606"/>
             <a:ext cx="195067" cy="186651"/>
           </a:xfrm>
           <a:custGeom>
@@ -9398,15 +9355,15 @@
         </p:spPr>
         <p:style>
           <a:lnRef idx="2">
-            <a:schemeClr val="accent1">
+            <a:schemeClr val="accent4">
               <a:shade val="50000"/>
             </a:schemeClr>
           </a:lnRef>
           <a:fillRef idx="1">
-            <a:schemeClr val="accent1"/>
+            <a:schemeClr val="accent4"/>
           </a:fillRef>
           <a:effectRef idx="0">
-            <a:schemeClr val="accent1"/>
+            <a:schemeClr val="accent4"/>
           </a:effectRef>
           <a:fontRef idx="minor">
             <a:schemeClr val="lt1"/>
@@ -9429,7 +9386,7 @@
         </p:nvCxnSpPr>
         <p:spPr>
           <a:xfrm flipH="1" flipV="1">
-            <a:off x="4245931" y="1962688"/>
+            <a:off x="4530439" y="1697307"/>
             <a:ext cx="230910" cy="912016"/>
           </a:xfrm>
           <a:prstGeom prst="straightConnector1">
@@ -9437,7 +9394,7 @@
           </a:prstGeom>
           <a:ln w="28575">
             <a:solidFill>
-              <a:schemeClr val="tx1"/>
+              <a:srgbClr val="0070C0"/>
             </a:solidFill>
             <a:tailEnd type="triangle"/>
           </a:ln>
@@ -9465,7 +9422,7 @@
         </p:nvSpPr>
         <p:spPr>
           <a:xfrm>
-            <a:off x="4144331" y="1660031"/>
+            <a:off x="4428839" y="1394650"/>
             <a:ext cx="443345" cy="369332"/>
           </a:xfrm>
           <a:prstGeom prst="rect">
@@ -9480,10 +9437,9 @@
           <a:lstStyle/>
           <a:p>
             <a:r>
-              <a:rPr lang="en-US" dirty="0" smtClean="0"/>
+              <a:rPr lang="en-US" dirty="0"/>
               <a:t>Z’</a:t>
             </a:r>
-            <a:endParaRPr lang="en-US" dirty="0"/>
           </a:p>
         </p:txBody>
       </p:sp>
@@ -9495,7 +9451,7 @@
         </p:nvSpPr>
         <p:spPr>
           <a:xfrm>
-            <a:off x="5571349" y="2588438"/>
+            <a:off x="5855857" y="2323057"/>
             <a:ext cx="443345" cy="369332"/>
           </a:xfrm>
           <a:prstGeom prst="rect">
@@ -9510,10 +9466,9 @@
           <a:lstStyle/>
           <a:p>
             <a:r>
-              <a:rPr lang="en-US" dirty="0" smtClean="0"/>
+              <a:rPr lang="en-US" dirty="0"/>
               <a:t>X’</a:t>
             </a:r>
-            <a:endParaRPr lang="en-US" dirty="0"/>
           </a:p>
         </p:txBody>
       </p:sp>
@@ -9525,7 +9480,7 @@
         </p:nvCxnSpPr>
         <p:spPr>
           <a:xfrm rot="5400000" flipV="1">
-            <a:off x="5007931" y="2343613"/>
+            <a:off x="5292439" y="2078232"/>
             <a:ext cx="0" cy="1062182"/>
           </a:xfrm>
           <a:prstGeom prst="straightConnector1">
@@ -9533,7 +9488,7 @@
           </a:prstGeom>
           <a:ln w="28575">
             <a:solidFill>
-              <a:schemeClr val="tx1"/>
+              <a:srgbClr val="FF0000"/>
             </a:solidFill>
             <a:tailEnd type="triangle"/>
           </a:ln>
@@ -9561,7 +9516,7 @@
         </p:nvCxnSpPr>
         <p:spPr>
           <a:xfrm flipV="1">
-            <a:off x="4476840" y="2249016"/>
+            <a:off x="4761348" y="1983635"/>
             <a:ext cx="480291" cy="625688"/>
           </a:xfrm>
           <a:prstGeom prst="straightConnector1">
@@ -9569,7 +9524,7 @@
           </a:prstGeom>
           <a:ln w="28575">
             <a:solidFill>
-              <a:schemeClr val="tx1"/>
+              <a:srgbClr val="00B050"/>
             </a:solidFill>
             <a:tailEnd type="triangle"/>
           </a:ln>
@@ -9597,7 +9552,7 @@
         </p:nvSpPr>
         <p:spPr>
           <a:xfrm>
-            <a:off x="4901711" y="2020525"/>
+            <a:off x="5186219" y="1755144"/>
             <a:ext cx="443345" cy="369332"/>
           </a:xfrm>
           <a:prstGeom prst="rect">
@@ -9612,10 +9567,9 @@
           <a:lstStyle/>
           <a:p>
             <a:r>
-              <a:rPr lang="en-US" dirty="0" smtClean="0"/>
+              <a:rPr lang="en-US" dirty="0"/>
               <a:t>Y’</a:t>
             </a:r>
-            <a:endParaRPr lang="en-US" dirty="0"/>
           </a:p>
         </p:txBody>
       </p:sp>
@@ -9627,7 +9581,7 @@
         </p:nvCxnSpPr>
         <p:spPr>
           <a:xfrm flipV="1">
-            <a:off x="4476840" y="1813806"/>
+            <a:off x="4761348" y="1548425"/>
             <a:ext cx="0" cy="1062182"/>
           </a:xfrm>
           <a:prstGeom prst="straightConnector1">
@@ -9664,7 +9618,7 @@
         </p:nvCxnSpPr>
         <p:spPr>
           <a:xfrm flipV="1">
-            <a:off x="4476840" y="2478824"/>
+            <a:off x="4761348" y="2213443"/>
             <a:ext cx="581891" cy="397164"/>
           </a:xfrm>
           <a:prstGeom prst="straightConnector1">
@@ -9701,7 +9655,7 @@
         </p:nvSpPr>
         <p:spPr>
           <a:xfrm>
-            <a:off x="5896226" y="2020494"/>
+            <a:off x="6180734" y="1755113"/>
             <a:ext cx="443345" cy="369332"/>
           </a:xfrm>
           <a:prstGeom prst="rect">
@@ -9716,10 +9670,9 @@
           <a:lstStyle/>
           <a:p>
             <a:r>
-              <a:rPr lang="en-US" dirty="0" smtClean="0"/>
+              <a:rPr lang="en-US" dirty="0"/>
               <a:t>Z’’</a:t>
             </a:r>
-            <a:endParaRPr lang="en-US" dirty="0"/>
           </a:p>
         </p:txBody>
       </p:sp>
@@ -9731,7 +9684,7 @@
         </p:nvSpPr>
         <p:spPr>
           <a:xfrm>
-            <a:off x="7530988" y="1716448"/>
+            <a:off x="7815496" y="1451067"/>
             <a:ext cx="443345" cy="369332"/>
           </a:xfrm>
           <a:prstGeom prst="rect">
@@ -9746,10 +9699,9 @@
           <a:lstStyle/>
           <a:p>
             <a:r>
-              <a:rPr lang="en-US" dirty="0" smtClean="0"/>
+              <a:rPr lang="en-US" dirty="0"/>
               <a:t>X’’</a:t>
             </a:r>
-            <a:endParaRPr lang="en-US" dirty="0"/>
           </a:p>
         </p:txBody>
       </p:sp>
@@ -9761,7 +9713,7 @@
         </p:nvGrpSpPr>
         <p:grpSpPr>
           <a:xfrm rot="18602764">
-            <a:off x="6138930" y="1898409"/>
+            <a:off x="6423438" y="1633028"/>
             <a:ext cx="1355357" cy="881749"/>
             <a:chOff x="4625187" y="1437560"/>
             <a:chExt cx="1355357" cy="881749"/>
@@ -9783,7 +9735,7 @@
             </a:prstGeom>
             <a:ln w="28575">
               <a:solidFill>
-                <a:schemeClr val="tx1"/>
+                <a:srgbClr val="0070C0"/>
               </a:solidFill>
               <a:tailEnd type="triangle"/>
             </a:ln>
@@ -9819,7 +9771,7 @@
             </a:prstGeom>
             <a:ln w="28575">
               <a:solidFill>
-                <a:schemeClr val="tx1"/>
+                <a:srgbClr val="FF0000"/>
               </a:solidFill>
               <a:tailEnd type="triangle"/>
             </a:ln>
@@ -9855,7 +9807,7 @@
             </a:prstGeom>
             <a:ln w="28575">
               <a:solidFill>
-                <a:schemeClr val="tx1"/>
+                <a:srgbClr val="00B050"/>
               </a:solidFill>
               <a:tailEnd type="triangle"/>
             </a:ln>
@@ -9884,7 +9836,7 @@
         </p:nvSpPr>
         <p:spPr>
           <a:xfrm>
-            <a:off x="6833718" y="2097188"/>
+            <a:off x="7118226" y="1831807"/>
             <a:ext cx="443345" cy="369332"/>
           </a:xfrm>
           <a:prstGeom prst="rect">
@@ -9899,10 +9851,9 @@
           <a:lstStyle/>
           <a:p>
             <a:r>
-              <a:rPr lang="en-US" dirty="0" smtClean="0"/>
+              <a:rPr lang="en-US" dirty="0"/>
               <a:t>Y’’</a:t>
             </a:r>
-            <a:endParaRPr lang="en-US" dirty="0"/>
           </a:p>
         </p:txBody>
       </p:sp>
@@ -9914,7 +9865,7 @@
         </p:nvCxnSpPr>
         <p:spPr>
           <a:xfrm flipV="1">
-            <a:off x="6845966" y="1813806"/>
+            <a:off x="7130474" y="1548425"/>
             <a:ext cx="0" cy="1062182"/>
           </a:xfrm>
           <a:prstGeom prst="straightConnector1">
@@ -9951,7 +9902,7 @@
         </p:nvCxnSpPr>
         <p:spPr>
           <a:xfrm flipV="1">
-            <a:off x="6845966" y="2478824"/>
+            <a:off x="7130474" y="2213443"/>
             <a:ext cx="581891" cy="397164"/>
           </a:xfrm>
           <a:prstGeom prst="straightConnector1">
@@ -9988,7 +9939,7 @@
         </p:nvCxnSpPr>
         <p:spPr>
           <a:xfrm rot="5400000" flipV="1">
-            <a:off x="7377057" y="2345579"/>
+            <a:off x="7661565" y="2080198"/>
             <a:ext cx="0" cy="1062182"/>
           </a:xfrm>
           <a:prstGeom prst="straightConnector1">
@@ -10025,7 +9976,7 @@
         </p:nvSpPr>
         <p:spPr>
           <a:xfrm>
-            <a:off x="9205107" y="1844697"/>
+            <a:off x="9489615" y="1579316"/>
             <a:ext cx="517603" cy="369332"/>
           </a:xfrm>
           <a:prstGeom prst="rect">
@@ -10040,10 +9991,9 @@
           <a:lstStyle/>
           <a:p>
             <a:r>
-              <a:rPr lang="en-US" dirty="0" smtClean="0"/>
+              <a:rPr lang="en-US" dirty="0"/>
               <a:t>Z’’’</a:t>
             </a:r>
-            <a:endParaRPr lang="en-US" dirty="0"/>
           </a:p>
         </p:txBody>
       </p:sp>
@@ -10055,7 +10005,7 @@
         </p:nvSpPr>
         <p:spPr>
           <a:xfrm>
-            <a:off x="8441376" y="1757463"/>
+            <a:off x="8725884" y="1492082"/>
             <a:ext cx="488878" cy="369332"/>
           </a:xfrm>
           <a:prstGeom prst="rect">
@@ -10070,10 +10020,9 @@
           <a:lstStyle/>
           <a:p>
             <a:r>
-              <a:rPr lang="en-US" dirty="0" smtClean="0"/>
+              <a:rPr lang="en-US" dirty="0"/>
               <a:t>X’’’</a:t>
             </a:r>
-            <a:endParaRPr lang="en-US" dirty="0"/>
           </a:p>
         </p:txBody>
       </p:sp>
@@ -10085,7 +10034,7 @@
         </p:nvGrpSpPr>
         <p:grpSpPr>
           <a:xfrm rot="18602764">
-            <a:off x="8754323" y="2122054"/>
+            <a:off x="9038831" y="1856673"/>
             <a:ext cx="892947" cy="1233552"/>
             <a:chOff x="4714444" y="1682491"/>
             <a:chExt cx="892947" cy="1233552"/>
@@ -10107,7 +10056,7 @@
             </a:prstGeom>
             <a:ln w="28575">
               <a:solidFill>
-                <a:schemeClr val="tx1"/>
+                <a:srgbClr val="0070C0"/>
               </a:solidFill>
               <a:tailEnd type="triangle"/>
             </a:ln>
@@ -10143,7 +10092,7 @@
             </a:prstGeom>
             <a:ln w="28575">
               <a:solidFill>
-                <a:schemeClr val="tx1"/>
+                <a:srgbClr val="FF0000"/>
               </a:solidFill>
               <a:tailEnd type="triangle"/>
             </a:ln>
@@ -10179,7 +10128,7 @@
             </a:prstGeom>
             <a:ln w="28575">
               <a:solidFill>
-                <a:schemeClr val="tx1"/>
+                <a:srgbClr val="00B050"/>
               </a:solidFill>
               <a:tailEnd type="triangle"/>
             </a:ln>
@@ -10208,7 +10157,7 @@
         </p:nvSpPr>
         <p:spPr>
           <a:xfrm>
-            <a:off x="9923305" y="2168878"/>
+            <a:off x="10207813" y="1903497"/>
             <a:ext cx="594139" cy="369332"/>
           </a:xfrm>
           <a:prstGeom prst="rect">
@@ -10223,10 +10172,9 @@
           <a:lstStyle/>
           <a:p>
             <a:r>
-              <a:rPr lang="en-US" dirty="0" smtClean="0"/>
+              <a:rPr lang="en-US" dirty="0"/>
               <a:t>Y’’’</a:t>
             </a:r>
-            <a:endParaRPr lang="en-US" dirty="0"/>
           </a:p>
         </p:txBody>
       </p:sp>
@@ -10238,7 +10186,7 @@
         </p:nvCxnSpPr>
         <p:spPr>
           <a:xfrm flipV="1">
-            <a:off x="8990700" y="1813806"/>
+            <a:off x="9275208" y="1548425"/>
             <a:ext cx="0" cy="1062182"/>
           </a:xfrm>
           <a:prstGeom prst="straightConnector1">
@@ -10275,7 +10223,7 @@
         </p:nvCxnSpPr>
         <p:spPr>
           <a:xfrm flipV="1">
-            <a:off x="8990700" y="2478824"/>
+            <a:off x="9275208" y="2213443"/>
             <a:ext cx="581891" cy="397164"/>
           </a:xfrm>
           <a:prstGeom prst="straightConnector1">
@@ -10312,7 +10260,7 @@
         </p:nvCxnSpPr>
         <p:spPr>
           <a:xfrm rot="5400000" flipV="1">
-            <a:off x="9532027" y="2367810"/>
+            <a:off x="9816535" y="2102429"/>
             <a:ext cx="0" cy="1062182"/>
           </a:xfrm>
           <a:prstGeom prst="straightConnector1">
@@ -10349,13 +10297,13 @@
         </p:nvSpPr>
         <p:spPr>
           <a:xfrm>
-            <a:off x="5123568" y="2619971"/>
+            <a:off x="5408076" y="2354590"/>
             <a:ext cx="249673" cy="495223"/>
           </a:xfrm>
           <a:prstGeom prst="arc">
             <a:avLst>
-              <a:gd name="adj1" fmla="val 17665421"/>
-              <a:gd name="adj2" fmla="val 13906721"/>
+              <a:gd name="adj1" fmla="val 17075382"/>
+              <a:gd name="adj2" fmla="val 562608"/>
             </a:avLst>
           </a:prstGeom>
           <a:ln>
@@ -10397,13 +10345,13 @@
         </p:nvSpPr>
         <p:spPr>
           <a:xfrm>
-            <a:off x="7178209" y="2409670"/>
+            <a:off x="7462717" y="2144289"/>
             <a:ext cx="273148" cy="297498"/>
           </a:xfrm>
           <a:prstGeom prst="arc">
             <a:avLst>
               <a:gd name="adj1" fmla="val 572274"/>
-              <a:gd name="adj2" fmla="val 16564627"/>
+              <a:gd name="adj2" fmla="val 9470524"/>
             </a:avLst>
           </a:prstGeom>
           <a:ln>
@@ -10445,12 +10393,12 @@
         </p:nvSpPr>
         <p:spPr>
           <a:xfrm>
-            <a:off x="8779868" y="1968650"/>
+            <a:off x="9064376" y="1703269"/>
             <a:ext cx="421663" cy="234259"/>
           </a:xfrm>
           <a:prstGeom prst="arc">
             <a:avLst>
-              <a:gd name="adj1" fmla="val 18577427"/>
+              <a:gd name="adj1" fmla="val 4785669"/>
               <a:gd name="adj2" fmla="val 13265520"/>
             </a:avLst>
           </a:prstGeom>
@@ -10493,7 +10441,7 @@
         </p:nvSpPr>
         <p:spPr>
           <a:xfrm>
-            <a:off x="1356731" y="1823327"/>
+            <a:off x="1356731" y="2158878"/>
             <a:ext cx="649618" cy="1053629"/>
           </a:xfrm>
           <a:custGeom>
@@ -10601,15 +10549,15 @@
         </p:spPr>
         <p:style>
           <a:lnRef idx="2">
-            <a:schemeClr val="accent1">
+            <a:schemeClr val="accent4">
               <a:shade val="50000"/>
             </a:schemeClr>
           </a:lnRef>
           <a:fillRef idx="1">
-            <a:schemeClr val="accent1"/>
+            <a:schemeClr val="accent4"/>
           </a:fillRef>
           <a:effectRef idx="0">
-            <a:schemeClr val="accent1"/>
+            <a:schemeClr val="accent4"/>
           </a:effectRef>
           <a:fontRef idx="minor">
             <a:schemeClr val="lt1"/>
@@ -10632,7 +10580,7 @@
         </p:nvSpPr>
         <p:spPr>
           <a:xfrm rot="21059567">
-            <a:off x="1662776" y="2089479"/>
+            <a:off x="1662776" y="2425030"/>
             <a:ext cx="794832" cy="315085"/>
           </a:xfrm>
           <a:custGeom>
@@ -11014,15 +10962,15 @@
         </p:spPr>
         <p:style>
           <a:lnRef idx="2">
-            <a:schemeClr val="accent1">
+            <a:schemeClr val="accent4">
               <a:shade val="50000"/>
             </a:schemeClr>
           </a:lnRef>
           <a:fillRef idx="1">
-            <a:schemeClr val="accent1"/>
+            <a:schemeClr val="accent4"/>
           </a:fillRef>
           <a:effectRef idx="0">
-            <a:schemeClr val="accent1"/>
+            <a:schemeClr val="accent4"/>
           </a:effectRef>
           <a:fontRef idx="minor">
             <a:schemeClr val="lt1"/>
@@ -11045,7 +10993,7 @@
         </p:nvGrpSpPr>
         <p:grpSpPr>
           <a:xfrm rot="18602764">
-            <a:off x="1447119" y="1646133"/>
+            <a:off x="1447119" y="1981684"/>
             <a:ext cx="892947" cy="1233552"/>
             <a:chOff x="4714444" y="1682491"/>
             <a:chExt cx="892947" cy="1233552"/>
@@ -11067,7 +11015,7 @@
             </a:prstGeom>
             <a:ln w="28575">
               <a:solidFill>
-                <a:schemeClr val="tx1"/>
+                <a:srgbClr val="0070C0"/>
               </a:solidFill>
               <a:tailEnd type="triangle"/>
             </a:ln>
@@ -11103,7 +11051,7 @@
             </a:prstGeom>
             <a:ln w="28575">
               <a:solidFill>
-                <a:schemeClr val="tx1"/>
+                <a:srgbClr val="FF0000"/>
               </a:solidFill>
               <a:tailEnd type="triangle"/>
             </a:ln>
@@ -11139,7 +11087,7 @@
             </a:prstGeom>
             <a:ln w="28575">
               <a:solidFill>
-                <a:schemeClr val="tx1"/>
+                <a:srgbClr val="00B050"/>
               </a:solidFill>
               <a:tailEnd type="triangle"/>
             </a:ln>
@@ -11170,7 +11118,7 @@
             </p:nvSpPr>
             <p:spPr>
               <a:xfrm>
-                <a:off x="4426244" y="1255712"/>
+                <a:off x="4710752" y="1166789"/>
                 <a:ext cx="1163373" cy="369332"/>
               </a:xfrm>
               <a:prstGeom prst="rect">
@@ -11184,6 +11132,7 @@
               </a:bodyPr>
               <a:lstStyle/>
               <a:p>
+                <a:pPr/>
                 <a14:m>
                   <m:oMathPara xmlns:m="http://schemas.openxmlformats.org/officeDocument/2006/math">
                     <m:oMathParaPr>
@@ -11252,7 +11201,7 @@
             </p:nvSpPr>
             <p:spPr>
               <a:xfrm>
-                <a:off x="4426244" y="1255712"/>
+                <a:off x="4710752" y="1166789"/>
                 <a:ext cx="1163373" cy="369332"/>
               </a:xfrm>
               <a:prstGeom prst="rect">
@@ -11261,7 +11210,7 @@
               <a:blipFill>
                 <a:blip r:embed="rId2"/>
                 <a:stretch>
-                  <a:fillRect b="-11475"/>
+                  <a:fillRect b="-13115"/>
                 </a:stretch>
               </a:blipFill>
             </p:spPr>
@@ -11288,7 +11237,7 @@
         </p:nvSpPr>
         <p:spPr>
           <a:xfrm>
-            <a:off x="1874802" y="1357951"/>
+            <a:off x="1874802" y="1693502"/>
             <a:ext cx="517603" cy="369332"/>
           </a:xfrm>
           <a:prstGeom prst="rect">
@@ -11303,10 +11252,9 @@
           <a:lstStyle/>
           <a:p>
             <a:r>
-              <a:rPr lang="en-US" dirty="0" smtClean="0"/>
+              <a:rPr lang="en-US" dirty="0"/>
               <a:t>Z’’’</a:t>
             </a:r>
-            <a:endParaRPr lang="en-US" dirty="0"/>
           </a:p>
         </p:txBody>
       </p:sp>
@@ -11318,7 +11266,7 @@
         </p:nvSpPr>
         <p:spPr>
           <a:xfrm>
-            <a:off x="1111071" y="1270717"/>
+            <a:off x="1111071" y="1606268"/>
             <a:ext cx="488878" cy="369332"/>
           </a:xfrm>
           <a:prstGeom prst="rect">
@@ -11333,10 +11281,9 @@
           <a:lstStyle/>
           <a:p>
             <a:r>
-              <a:rPr lang="en-US" dirty="0" smtClean="0"/>
+              <a:rPr lang="en-US" dirty="0"/>
               <a:t>X’’’</a:t>
             </a:r>
-            <a:endParaRPr lang="en-US" dirty="0"/>
           </a:p>
         </p:txBody>
       </p:sp>
@@ -11348,7 +11295,7 @@
         </p:nvSpPr>
         <p:spPr>
           <a:xfrm>
-            <a:off x="2593000" y="1682132"/>
+            <a:off x="2593000" y="2017683"/>
             <a:ext cx="594139" cy="369332"/>
           </a:xfrm>
           <a:prstGeom prst="rect">
@@ -11363,10 +11310,9 @@
           <a:lstStyle/>
           <a:p>
             <a:r>
-              <a:rPr lang="en-US" dirty="0" smtClean="0"/>
+              <a:rPr lang="en-US" dirty="0"/>
               <a:t>Y’’’</a:t>
             </a:r>
-            <a:endParaRPr lang="en-US" dirty="0"/>
           </a:p>
         </p:txBody>
       </p:sp>
@@ -11380,7 +11326,7 @@
             </p:nvSpPr>
             <p:spPr>
               <a:xfrm>
-                <a:off x="6733096" y="1255712"/>
+                <a:off x="7017604" y="1166789"/>
                 <a:ext cx="1163373" cy="369332"/>
               </a:xfrm>
               <a:prstGeom prst="rect">
@@ -11394,6 +11340,7 @@
               </a:bodyPr>
               <a:lstStyle/>
               <a:p>
+                <a:pPr/>
                 <a14:m>
                   <m:oMathPara xmlns:m="http://schemas.openxmlformats.org/officeDocument/2006/math">
                     <m:oMathParaPr>
@@ -11462,7 +11409,7 @@
             </p:nvSpPr>
             <p:spPr>
               <a:xfrm>
-                <a:off x="6733096" y="1255712"/>
+                <a:off x="7017604" y="1166789"/>
                 <a:ext cx="1163373" cy="369332"/>
               </a:xfrm>
               <a:prstGeom prst="rect">
@@ -11471,7 +11418,7 @@
               <a:blipFill>
                 <a:blip r:embed="rId3"/>
                 <a:stretch>
-                  <a:fillRect b="-11475"/>
+                  <a:fillRect b="-13115"/>
                 </a:stretch>
               </a:blipFill>
             </p:spPr>
@@ -11500,7 +11447,7 @@
             </p:nvSpPr>
             <p:spPr>
               <a:xfrm>
-                <a:off x="8827352" y="1255712"/>
+                <a:off x="9111860" y="1166789"/>
                 <a:ext cx="1163373" cy="369332"/>
               </a:xfrm>
               <a:prstGeom prst="rect">
@@ -11514,6 +11461,7 @@
               </a:bodyPr>
               <a:lstStyle/>
               <a:p>
+                <a:pPr/>
                 <a14:m>
                   <m:oMathPara xmlns:m="http://schemas.openxmlformats.org/officeDocument/2006/math">
                     <m:oMathParaPr>
@@ -11582,7 +11530,7 @@
             </p:nvSpPr>
             <p:spPr>
               <a:xfrm>
-                <a:off x="8827352" y="1255712"/>
+                <a:off x="9111860" y="1166789"/>
                 <a:ext cx="1163373" cy="369332"/>
               </a:xfrm>
               <a:prstGeom prst="rect">
@@ -11591,7 +11539,7 @@
               <a:blipFill>
                 <a:blip r:embed="rId4"/>
                 <a:stretch>
-                  <a:fillRect b="-11475"/>
+                  <a:fillRect b="-13115"/>
                 </a:stretch>
               </a:blipFill>
             </p:spPr>
@@ -11618,7 +11566,7 @@
         </p:nvSpPr>
         <p:spPr>
           <a:xfrm>
-            <a:off x="1929297" y="2729180"/>
+            <a:off x="1929297" y="3064731"/>
             <a:ext cx="272037" cy="120457"/>
           </a:xfrm>
           <a:custGeom>
@@ -11796,15 +11744,15 @@
         </p:spPr>
         <p:style>
           <a:lnRef idx="2">
-            <a:schemeClr val="accent1">
+            <a:schemeClr val="accent4">
               <a:shade val="50000"/>
             </a:schemeClr>
           </a:lnRef>
           <a:fillRef idx="1">
-            <a:schemeClr val="accent1"/>
+            <a:schemeClr val="accent4"/>
           </a:fillRef>
           <a:effectRef idx="0">
-            <a:schemeClr val="accent1"/>
+            <a:schemeClr val="accent4"/>
           </a:effectRef>
           <a:fontRef idx="minor">
             <a:schemeClr val="lt1"/>
@@ -11816,6 +11764,1864 @@
           <a:p>
             <a:pPr algn="ctr"/>
             <a:endParaRPr lang="en-US"/>
+          </a:p>
+        </p:txBody>
+      </p:sp>
+      <p:sp>
+        <p:nvSpPr>
+          <p:cNvPr id="2" name="TextBox 1">
+            <a:extLst>
+              <a:ext uri="{FF2B5EF4-FFF2-40B4-BE49-F238E27FC236}">
+                <a16:creationId xmlns:a16="http://schemas.microsoft.com/office/drawing/2014/main" id="{CE5D64AE-AD1D-43C7-BBCC-0947FCBBE895}"/>
+              </a:ext>
+            </a:extLst>
+          </p:cNvPr>
+          <p:cNvSpPr txBox="1"/>
+          <p:nvPr/>
+        </p:nvSpPr>
+        <p:spPr>
+          <a:xfrm rot="16200000">
+            <a:off x="3495467" y="1763981"/>
+            <a:ext cx="1460591" cy="369332"/>
+          </a:xfrm>
+          <a:prstGeom prst="rect">
+            <a:avLst/>
+          </a:prstGeom>
+          <a:noFill/>
+        </p:spPr>
+        <p:txBody>
+          <a:bodyPr wrap="square" rtlCol="0">
+            <a:spAutoFit/>
+          </a:bodyPr>
+          <a:lstStyle/>
+          <a:p>
+            <a:r>
+              <a:rPr lang="en-US" dirty="0"/>
+              <a:t>Extrinsic view</a:t>
+            </a:r>
+          </a:p>
+        </p:txBody>
+      </p:sp>
+      <p:sp>
+        <p:nvSpPr>
+          <p:cNvPr id="57" name="TextBox 56">
+            <a:extLst>
+              <a:ext uri="{FF2B5EF4-FFF2-40B4-BE49-F238E27FC236}">
+                <a16:creationId xmlns:a16="http://schemas.microsoft.com/office/drawing/2014/main" id="{42BFF1EF-B6AB-4D5B-AAD3-6B56C68E4349}"/>
+              </a:ext>
+            </a:extLst>
+          </p:cNvPr>
+          <p:cNvSpPr txBox="1"/>
+          <p:nvPr/>
+        </p:nvSpPr>
+        <p:spPr>
+          <a:xfrm rot="16200000">
+            <a:off x="3495468" y="3802810"/>
+            <a:ext cx="1460591" cy="369332"/>
+          </a:xfrm>
+          <a:prstGeom prst="rect">
+            <a:avLst/>
+          </a:prstGeom>
+          <a:noFill/>
+        </p:spPr>
+        <p:txBody>
+          <a:bodyPr wrap="square" rtlCol="0">
+            <a:spAutoFit/>
+          </a:bodyPr>
+          <a:lstStyle/>
+          <a:p>
+            <a:r>
+              <a:rPr lang="en-US" dirty="0"/>
+              <a:t>Intrinsic view</a:t>
+            </a:r>
+          </a:p>
+        </p:txBody>
+      </p:sp>
+      <p:cxnSp>
+        <p:nvCxnSpPr>
+          <p:cNvPr id="58" name="Straight Arrow Connector 57">
+            <a:extLst>
+              <a:ext uri="{FF2B5EF4-FFF2-40B4-BE49-F238E27FC236}">
+                <a16:creationId xmlns:a16="http://schemas.microsoft.com/office/drawing/2014/main" id="{EDD0386E-BCBD-41A7-80F9-16EED69EC681}"/>
+              </a:ext>
+            </a:extLst>
+          </p:cNvPr>
+          <p:cNvCxnSpPr>
+            <a:cxnSpLocks/>
+          </p:cNvCxnSpPr>
+          <p:nvPr/>
+        </p:nvCxnSpPr>
+        <p:spPr>
+          <a:xfrm flipH="1" flipV="1">
+            <a:off x="4774431" y="3442701"/>
+            <a:ext cx="5011" cy="1045801"/>
+          </a:xfrm>
+          <a:prstGeom prst="straightConnector1">
+            <a:avLst/>
+          </a:prstGeom>
+          <a:ln w="28575">
+            <a:solidFill>
+              <a:srgbClr val="0070C0"/>
+            </a:solidFill>
+            <a:tailEnd type="triangle"/>
+          </a:ln>
+        </p:spPr>
+        <p:style>
+          <a:lnRef idx="1">
+            <a:schemeClr val="accent1"/>
+          </a:lnRef>
+          <a:fillRef idx="0">
+            <a:schemeClr val="accent1"/>
+          </a:fillRef>
+          <a:effectRef idx="0">
+            <a:schemeClr val="accent1"/>
+          </a:effectRef>
+          <a:fontRef idx="minor">
+            <a:schemeClr val="tx1"/>
+          </a:fontRef>
+        </p:style>
+      </p:cxnSp>
+      <p:sp>
+        <p:nvSpPr>
+          <p:cNvPr id="59" name="TextBox 58">
+            <a:extLst>
+              <a:ext uri="{FF2B5EF4-FFF2-40B4-BE49-F238E27FC236}">
+                <a16:creationId xmlns:a16="http://schemas.microsoft.com/office/drawing/2014/main" id="{4035AC24-9F5A-49B4-8157-BF50D8CDBAC5}"/>
+              </a:ext>
+            </a:extLst>
+          </p:cNvPr>
+          <p:cNvSpPr txBox="1"/>
+          <p:nvPr/>
+        </p:nvSpPr>
+        <p:spPr>
+          <a:xfrm>
+            <a:off x="4446932" y="3273829"/>
+            <a:ext cx="443345" cy="369332"/>
+          </a:xfrm>
+          <a:prstGeom prst="rect">
+            <a:avLst/>
+          </a:prstGeom>
+          <a:noFill/>
+        </p:spPr>
+        <p:txBody>
+          <a:bodyPr wrap="square" rtlCol="0">
+            <a:spAutoFit/>
+          </a:bodyPr>
+          <a:lstStyle/>
+          <a:p>
+            <a:r>
+              <a:rPr lang="en-US" dirty="0"/>
+              <a:t>Z’</a:t>
+            </a:r>
+          </a:p>
+        </p:txBody>
+      </p:sp>
+      <p:sp>
+        <p:nvSpPr>
+          <p:cNvPr id="60" name="TextBox 59">
+            <a:extLst>
+              <a:ext uri="{FF2B5EF4-FFF2-40B4-BE49-F238E27FC236}">
+                <a16:creationId xmlns:a16="http://schemas.microsoft.com/office/drawing/2014/main" id="{729ABEB0-61EE-4B5F-8430-EEA61ACB4F1E}"/>
+              </a:ext>
+            </a:extLst>
+          </p:cNvPr>
+          <p:cNvSpPr txBox="1"/>
+          <p:nvPr/>
+        </p:nvSpPr>
+        <p:spPr>
+          <a:xfrm>
+            <a:off x="5052293" y="4776913"/>
+            <a:ext cx="443345" cy="369332"/>
+          </a:xfrm>
+          <a:prstGeom prst="rect">
+            <a:avLst/>
+          </a:prstGeom>
+          <a:noFill/>
+        </p:spPr>
+        <p:txBody>
+          <a:bodyPr wrap="square" rtlCol="0">
+            <a:spAutoFit/>
+          </a:bodyPr>
+          <a:lstStyle/>
+          <a:p>
+            <a:r>
+              <a:rPr lang="en-US" dirty="0"/>
+              <a:t>X’</a:t>
+            </a:r>
+          </a:p>
+        </p:txBody>
+      </p:sp>
+      <p:cxnSp>
+        <p:nvCxnSpPr>
+          <p:cNvPr id="61" name="Straight Arrow Connector 60">
+            <a:extLst>
+              <a:ext uri="{FF2B5EF4-FFF2-40B4-BE49-F238E27FC236}">
+                <a16:creationId xmlns:a16="http://schemas.microsoft.com/office/drawing/2014/main" id="{F5A2E58F-3350-4BDF-A189-B23E132F25EE}"/>
+              </a:ext>
+            </a:extLst>
+          </p:cNvPr>
+          <p:cNvCxnSpPr>
+            <a:cxnSpLocks/>
+          </p:cNvCxnSpPr>
+          <p:nvPr/>
+        </p:nvCxnSpPr>
+        <p:spPr>
+          <a:xfrm>
+            <a:off x="4779441" y="4488502"/>
+            <a:ext cx="202975" cy="522037"/>
+          </a:xfrm>
+          <a:prstGeom prst="straightConnector1">
+            <a:avLst/>
+          </a:prstGeom>
+          <a:ln w="28575">
+            <a:solidFill>
+              <a:srgbClr val="FF0000"/>
+            </a:solidFill>
+            <a:tailEnd type="triangle"/>
+          </a:ln>
+        </p:spPr>
+        <p:style>
+          <a:lnRef idx="1">
+            <a:schemeClr val="accent1"/>
+          </a:lnRef>
+          <a:fillRef idx="0">
+            <a:schemeClr val="accent1"/>
+          </a:fillRef>
+          <a:effectRef idx="0">
+            <a:schemeClr val="accent1"/>
+          </a:effectRef>
+          <a:fontRef idx="minor">
+            <a:schemeClr val="tx1"/>
+          </a:fontRef>
+        </p:style>
+      </p:cxnSp>
+      <p:cxnSp>
+        <p:nvCxnSpPr>
+          <p:cNvPr id="62" name="Straight Arrow Connector 61">
+            <a:extLst>
+              <a:ext uri="{FF2B5EF4-FFF2-40B4-BE49-F238E27FC236}">
+                <a16:creationId xmlns:a16="http://schemas.microsoft.com/office/drawing/2014/main" id="{2AFE615B-2B4C-4A41-97BE-BC2CE9AFDD3F}"/>
+              </a:ext>
+            </a:extLst>
+          </p:cNvPr>
+          <p:cNvCxnSpPr>
+            <a:cxnSpLocks/>
+          </p:cNvCxnSpPr>
+          <p:nvPr/>
+        </p:nvCxnSpPr>
+        <p:spPr>
+          <a:xfrm flipV="1">
+            <a:off x="4779441" y="4359660"/>
+            <a:ext cx="1106166" cy="128844"/>
+          </a:xfrm>
+          <a:prstGeom prst="straightConnector1">
+            <a:avLst/>
+          </a:prstGeom>
+          <a:ln w="28575">
+            <a:solidFill>
+              <a:srgbClr val="00B050"/>
+            </a:solidFill>
+            <a:tailEnd type="triangle"/>
+          </a:ln>
+        </p:spPr>
+        <p:style>
+          <a:lnRef idx="1">
+            <a:schemeClr val="accent1"/>
+          </a:lnRef>
+          <a:fillRef idx="0">
+            <a:schemeClr val="accent1"/>
+          </a:fillRef>
+          <a:effectRef idx="0">
+            <a:schemeClr val="accent1"/>
+          </a:effectRef>
+          <a:fontRef idx="minor">
+            <a:schemeClr val="tx1"/>
+          </a:fontRef>
+        </p:style>
+      </p:cxnSp>
+      <p:sp>
+        <p:nvSpPr>
+          <p:cNvPr id="63" name="TextBox 62">
+            <a:extLst>
+              <a:ext uri="{FF2B5EF4-FFF2-40B4-BE49-F238E27FC236}">
+                <a16:creationId xmlns:a16="http://schemas.microsoft.com/office/drawing/2014/main" id="{4C64D476-DAC9-40FC-A240-6FD700D1497B}"/>
+              </a:ext>
+            </a:extLst>
+          </p:cNvPr>
+          <p:cNvSpPr txBox="1"/>
+          <p:nvPr/>
+        </p:nvSpPr>
+        <p:spPr>
+          <a:xfrm>
+            <a:off x="5561254" y="4055096"/>
+            <a:ext cx="443345" cy="369332"/>
+          </a:xfrm>
+          <a:prstGeom prst="rect">
+            <a:avLst/>
+          </a:prstGeom>
+          <a:noFill/>
+        </p:spPr>
+        <p:txBody>
+          <a:bodyPr wrap="square" rtlCol="0">
+            <a:spAutoFit/>
+          </a:bodyPr>
+          <a:lstStyle/>
+          <a:p>
+            <a:r>
+              <a:rPr lang="en-US" dirty="0"/>
+              <a:t>Y’</a:t>
+            </a:r>
+          </a:p>
+        </p:txBody>
+      </p:sp>
+      <p:cxnSp>
+        <p:nvCxnSpPr>
+          <p:cNvPr id="65" name="Straight Arrow Connector 64">
+            <a:extLst>
+              <a:ext uri="{FF2B5EF4-FFF2-40B4-BE49-F238E27FC236}">
+                <a16:creationId xmlns:a16="http://schemas.microsoft.com/office/drawing/2014/main" id="{4540AAFE-F094-4F45-8A86-D6A4D3B041D3}"/>
+              </a:ext>
+            </a:extLst>
+          </p:cNvPr>
+          <p:cNvCxnSpPr/>
+          <p:nvPr/>
+        </p:nvCxnSpPr>
+        <p:spPr>
+          <a:xfrm flipV="1">
+            <a:off x="4779441" y="4092622"/>
+            <a:ext cx="581891" cy="397164"/>
+          </a:xfrm>
+          <a:prstGeom prst="straightConnector1">
+            <a:avLst/>
+          </a:prstGeom>
+          <a:ln w="12700">
+            <a:solidFill>
+              <a:schemeClr val="tx1"/>
+            </a:solidFill>
+            <a:prstDash val="dash"/>
+            <a:tailEnd type="triangle"/>
+          </a:ln>
+        </p:spPr>
+        <p:style>
+          <a:lnRef idx="1">
+            <a:schemeClr val="accent1"/>
+          </a:lnRef>
+          <a:fillRef idx="0">
+            <a:schemeClr val="accent1"/>
+          </a:fillRef>
+          <a:effectRef idx="0">
+            <a:schemeClr val="accent1"/>
+          </a:effectRef>
+          <a:fontRef idx="minor">
+            <a:schemeClr val="tx1"/>
+          </a:fontRef>
+        </p:style>
+      </p:cxnSp>
+      <p:sp>
+        <p:nvSpPr>
+          <p:cNvPr id="66" name="TextBox 65">
+            <a:extLst>
+              <a:ext uri="{FF2B5EF4-FFF2-40B4-BE49-F238E27FC236}">
+                <a16:creationId xmlns:a16="http://schemas.microsoft.com/office/drawing/2014/main" id="{BA1A575D-5C07-4119-86C8-83F25711C191}"/>
+              </a:ext>
+            </a:extLst>
+          </p:cNvPr>
+          <p:cNvSpPr txBox="1"/>
+          <p:nvPr/>
+        </p:nvSpPr>
+        <p:spPr>
+          <a:xfrm>
+            <a:off x="7279981" y="3802811"/>
+            <a:ext cx="443345" cy="369332"/>
+          </a:xfrm>
+          <a:prstGeom prst="rect">
+            <a:avLst/>
+          </a:prstGeom>
+          <a:noFill/>
+        </p:spPr>
+        <p:txBody>
+          <a:bodyPr wrap="square" rtlCol="0">
+            <a:spAutoFit/>
+          </a:bodyPr>
+          <a:lstStyle/>
+          <a:p>
+            <a:r>
+              <a:rPr lang="en-US" dirty="0"/>
+              <a:t>Z’’</a:t>
+            </a:r>
+          </a:p>
+        </p:txBody>
+      </p:sp>
+      <p:sp>
+        <p:nvSpPr>
+          <p:cNvPr id="67" name="TextBox 66">
+            <a:extLst>
+              <a:ext uri="{FF2B5EF4-FFF2-40B4-BE49-F238E27FC236}">
+                <a16:creationId xmlns:a16="http://schemas.microsoft.com/office/drawing/2014/main" id="{17E20FBB-563C-4AFA-BA51-50C8C1E74EC6}"/>
+              </a:ext>
+            </a:extLst>
+          </p:cNvPr>
+          <p:cNvSpPr txBox="1"/>
+          <p:nvPr/>
+        </p:nvSpPr>
+        <p:spPr>
+          <a:xfrm>
+            <a:off x="6565067" y="3367618"/>
+            <a:ext cx="443345" cy="369332"/>
+          </a:xfrm>
+          <a:prstGeom prst="rect">
+            <a:avLst/>
+          </a:prstGeom>
+          <a:noFill/>
+        </p:spPr>
+        <p:txBody>
+          <a:bodyPr wrap="square" rtlCol="0">
+            <a:spAutoFit/>
+          </a:bodyPr>
+          <a:lstStyle/>
+          <a:p>
+            <a:r>
+              <a:rPr lang="en-US" dirty="0"/>
+              <a:t>X’’</a:t>
+            </a:r>
+          </a:p>
+        </p:txBody>
+      </p:sp>
+      <p:cxnSp>
+        <p:nvCxnSpPr>
+          <p:cNvPr id="69" name="Straight Arrow Connector 68">
+            <a:extLst>
+              <a:ext uri="{FF2B5EF4-FFF2-40B4-BE49-F238E27FC236}">
+                <a16:creationId xmlns:a16="http://schemas.microsoft.com/office/drawing/2014/main" id="{B821C582-47BB-497F-90E3-45A2B6E1365E}"/>
+              </a:ext>
+            </a:extLst>
+          </p:cNvPr>
+          <p:cNvCxnSpPr>
+            <a:cxnSpLocks/>
+          </p:cNvCxnSpPr>
+          <p:nvPr/>
+        </p:nvCxnSpPr>
+        <p:spPr>
+          <a:xfrm flipV="1">
+            <a:off x="7150180" y="4278099"/>
+            <a:ext cx="543846" cy="203283"/>
+          </a:xfrm>
+          <a:prstGeom prst="straightConnector1">
+            <a:avLst/>
+          </a:prstGeom>
+          <a:ln w="28575">
+            <a:solidFill>
+              <a:srgbClr val="0070C0"/>
+            </a:solidFill>
+            <a:tailEnd type="triangle"/>
+          </a:ln>
+        </p:spPr>
+        <p:style>
+          <a:lnRef idx="1">
+            <a:schemeClr val="accent1"/>
+          </a:lnRef>
+          <a:fillRef idx="0">
+            <a:schemeClr val="accent1"/>
+          </a:fillRef>
+          <a:effectRef idx="0">
+            <a:schemeClr val="accent1"/>
+          </a:effectRef>
+          <a:fontRef idx="minor">
+            <a:schemeClr val="tx1"/>
+          </a:fontRef>
+        </p:style>
+      </p:cxnSp>
+      <p:sp>
+        <p:nvSpPr>
+          <p:cNvPr id="72" name="TextBox 71">
+            <a:extLst>
+              <a:ext uri="{FF2B5EF4-FFF2-40B4-BE49-F238E27FC236}">
+                <a16:creationId xmlns:a16="http://schemas.microsoft.com/office/drawing/2014/main" id="{D949C68A-AB9B-493E-B638-274F567F8AE0}"/>
+              </a:ext>
+            </a:extLst>
+          </p:cNvPr>
+          <p:cNvSpPr txBox="1"/>
+          <p:nvPr/>
+        </p:nvSpPr>
+        <p:spPr>
+          <a:xfrm>
+            <a:off x="8221485" y="4055096"/>
+            <a:ext cx="443345" cy="369332"/>
+          </a:xfrm>
+          <a:prstGeom prst="rect">
+            <a:avLst/>
+          </a:prstGeom>
+          <a:noFill/>
+        </p:spPr>
+        <p:txBody>
+          <a:bodyPr wrap="square" rtlCol="0">
+            <a:spAutoFit/>
+          </a:bodyPr>
+          <a:lstStyle/>
+          <a:p>
+            <a:r>
+              <a:rPr lang="en-US" dirty="0"/>
+              <a:t>Y’’</a:t>
+            </a:r>
+          </a:p>
+        </p:txBody>
+      </p:sp>
+      <p:cxnSp>
+        <p:nvCxnSpPr>
+          <p:cNvPr id="73" name="Straight Arrow Connector 72">
+            <a:extLst>
+              <a:ext uri="{FF2B5EF4-FFF2-40B4-BE49-F238E27FC236}">
+                <a16:creationId xmlns:a16="http://schemas.microsoft.com/office/drawing/2014/main" id="{23FF21AD-18EE-4789-B80E-8E57A3159064}"/>
+              </a:ext>
+            </a:extLst>
+          </p:cNvPr>
+          <p:cNvCxnSpPr/>
+          <p:nvPr/>
+        </p:nvCxnSpPr>
+        <p:spPr>
+          <a:xfrm flipV="1">
+            <a:off x="7148567" y="3427604"/>
+            <a:ext cx="0" cy="1062182"/>
+          </a:xfrm>
+          <a:prstGeom prst="straightConnector1">
+            <a:avLst/>
+          </a:prstGeom>
+          <a:ln w="12700">
+            <a:solidFill>
+              <a:schemeClr val="tx1"/>
+            </a:solidFill>
+            <a:prstDash val="dash"/>
+            <a:tailEnd type="triangle"/>
+          </a:ln>
+        </p:spPr>
+        <p:style>
+          <a:lnRef idx="1">
+            <a:schemeClr val="accent1"/>
+          </a:lnRef>
+          <a:fillRef idx="0">
+            <a:schemeClr val="accent1"/>
+          </a:fillRef>
+          <a:effectRef idx="0">
+            <a:schemeClr val="accent1"/>
+          </a:effectRef>
+          <a:fontRef idx="minor">
+            <a:schemeClr val="tx1"/>
+          </a:fontRef>
+        </p:style>
+      </p:cxnSp>
+      <p:cxnSp>
+        <p:nvCxnSpPr>
+          <p:cNvPr id="74" name="Straight Arrow Connector 73">
+            <a:extLst>
+              <a:ext uri="{FF2B5EF4-FFF2-40B4-BE49-F238E27FC236}">
+                <a16:creationId xmlns:a16="http://schemas.microsoft.com/office/drawing/2014/main" id="{99E735F5-7C19-4C6D-B205-BB4752BA8004}"/>
+              </a:ext>
+            </a:extLst>
+          </p:cNvPr>
+          <p:cNvCxnSpPr/>
+          <p:nvPr/>
+        </p:nvCxnSpPr>
+        <p:spPr>
+          <a:xfrm flipV="1">
+            <a:off x="7148567" y="4092622"/>
+            <a:ext cx="581891" cy="397164"/>
+          </a:xfrm>
+          <a:prstGeom prst="straightConnector1">
+            <a:avLst/>
+          </a:prstGeom>
+          <a:ln w="12700">
+            <a:solidFill>
+              <a:schemeClr val="tx1"/>
+            </a:solidFill>
+            <a:prstDash val="dash"/>
+            <a:tailEnd type="triangle"/>
+          </a:ln>
+        </p:spPr>
+        <p:style>
+          <a:lnRef idx="1">
+            <a:schemeClr val="accent1"/>
+          </a:lnRef>
+          <a:fillRef idx="0">
+            <a:schemeClr val="accent1"/>
+          </a:fillRef>
+          <a:effectRef idx="0">
+            <a:schemeClr val="accent1"/>
+          </a:effectRef>
+          <a:fontRef idx="minor">
+            <a:schemeClr val="tx1"/>
+          </a:fontRef>
+        </p:style>
+      </p:cxnSp>
+      <p:cxnSp>
+        <p:nvCxnSpPr>
+          <p:cNvPr id="75" name="Straight Arrow Connector 74">
+            <a:extLst>
+              <a:ext uri="{FF2B5EF4-FFF2-40B4-BE49-F238E27FC236}">
+                <a16:creationId xmlns:a16="http://schemas.microsoft.com/office/drawing/2014/main" id="{7C7D9182-7709-4CA9-92F6-0964866FCED0}"/>
+              </a:ext>
+            </a:extLst>
+          </p:cNvPr>
+          <p:cNvCxnSpPr/>
+          <p:nvPr/>
+        </p:nvCxnSpPr>
+        <p:spPr>
+          <a:xfrm rot="5400000" flipV="1">
+            <a:off x="7679658" y="3959377"/>
+            <a:ext cx="0" cy="1062182"/>
+          </a:xfrm>
+          <a:prstGeom prst="straightConnector1">
+            <a:avLst/>
+          </a:prstGeom>
+          <a:ln w="12700">
+            <a:solidFill>
+              <a:schemeClr val="tx1"/>
+            </a:solidFill>
+            <a:prstDash val="dash"/>
+            <a:tailEnd type="triangle"/>
+          </a:ln>
+        </p:spPr>
+        <p:style>
+          <a:lnRef idx="1">
+            <a:schemeClr val="accent1"/>
+          </a:lnRef>
+          <a:fillRef idx="0">
+            <a:schemeClr val="accent1"/>
+          </a:fillRef>
+          <a:effectRef idx="0">
+            <a:schemeClr val="accent1"/>
+          </a:effectRef>
+          <a:fontRef idx="minor">
+            <a:schemeClr val="tx1"/>
+          </a:fontRef>
+        </p:style>
+      </p:cxnSp>
+      <p:cxnSp>
+        <p:nvCxnSpPr>
+          <p:cNvPr id="78" name="Straight Arrow Connector 77">
+            <a:extLst>
+              <a:ext uri="{FF2B5EF4-FFF2-40B4-BE49-F238E27FC236}">
+                <a16:creationId xmlns:a16="http://schemas.microsoft.com/office/drawing/2014/main" id="{B4EA1AC8-73AB-497C-8359-A723C3044321}"/>
+              </a:ext>
+            </a:extLst>
+          </p:cNvPr>
+          <p:cNvCxnSpPr/>
+          <p:nvPr/>
+        </p:nvCxnSpPr>
+        <p:spPr>
+          <a:xfrm flipV="1">
+            <a:off x="9293301" y="3427604"/>
+            <a:ext cx="0" cy="1062182"/>
+          </a:xfrm>
+          <a:prstGeom prst="straightConnector1">
+            <a:avLst/>
+          </a:prstGeom>
+          <a:ln w="12700">
+            <a:solidFill>
+              <a:schemeClr val="tx1"/>
+            </a:solidFill>
+            <a:prstDash val="dash"/>
+            <a:tailEnd type="triangle"/>
+          </a:ln>
+        </p:spPr>
+        <p:style>
+          <a:lnRef idx="1">
+            <a:schemeClr val="accent1"/>
+          </a:lnRef>
+          <a:fillRef idx="0">
+            <a:schemeClr val="accent1"/>
+          </a:fillRef>
+          <a:effectRef idx="0">
+            <a:schemeClr val="accent1"/>
+          </a:effectRef>
+          <a:fontRef idx="minor">
+            <a:schemeClr val="tx1"/>
+          </a:fontRef>
+        </p:style>
+      </p:cxnSp>
+      <p:cxnSp>
+        <p:nvCxnSpPr>
+          <p:cNvPr id="79" name="Straight Arrow Connector 78">
+            <a:extLst>
+              <a:ext uri="{FF2B5EF4-FFF2-40B4-BE49-F238E27FC236}">
+                <a16:creationId xmlns:a16="http://schemas.microsoft.com/office/drawing/2014/main" id="{64CD3380-AEDB-435A-9298-10D3EF4CFAC8}"/>
+              </a:ext>
+            </a:extLst>
+          </p:cNvPr>
+          <p:cNvCxnSpPr/>
+          <p:nvPr/>
+        </p:nvCxnSpPr>
+        <p:spPr>
+          <a:xfrm flipV="1">
+            <a:off x="9293301" y="4092622"/>
+            <a:ext cx="581891" cy="397164"/>
+          </a:xfrm>
+          <a:prstGeom prst="straightConnector1">
+            <a:avLst/>
+          </a:prstGeom>
+          <a:ln w="12700">
+            <a:solidFill>
+              <a:schemeClr val="tx1"/>
+            </a:solidFill>
+            <a:prstDash val="dash"/>
+            <a:tailEnd type="triangle"/>
+          </a:ln>
+        </p:spPr>
+        <p:style>
+          <a:lnRef idx="1">
+            <a:schemeClr val="accent1"/>
+          </a:lnRef>
+          <a:fillRef idx="0">
+            <a:schemeClr val="accent1"/>
+          </a:fillRef>
+          <a:effectRef idx="0">
+            <a:schemeClr val="accent1"/>
+          </a:effectRef>
+          <a:fontRef idx="minor">
+            <a:schemeClr val="tx1"/>
+          </a:fontRef>
+        </p:style>
+      </p:cxnSp>
+      <p:cxnSp>
+        <p:nvCxnSpPr>
+          <p:cNvPr id="80" name="Straight Arrow Connector 79">
+            <a:extLst>
+              <a:ext uri="{FF2B5EF4-FFF2-40B4-BE49-F238E27FC236}">
+                <a16:creationId xmlns:a16="http://schemas.microsoft.com/office/drawing/2014/main" id="{0C5286BE-9465-434D-994F-46D420B63851}"/>
+              </a:ext>
+            </a:extLst>
+          </p:cNvPr>
+          <p:cNvCxnSpPr/>
+          <p:nvPr/>
+        </p:nvCxnSpPr>
+        <p:spPr>
+          <a:xfrm rot="5400000" flipV="1">
+            <a:off x="9834628" y="3981608"/>
+            <a:ext cx="0" cy="1062182"/>
+          </a:xfrm>
+          <a:prstGeom prst="straightConnector1">
+            <a:avLst/>
+          </a:prstGeom>
+          <a:ln w="12700">
+            <a:solidFill>
+              <a:schemeClr val="tx1"/>
+            </a:solidFill>
+            <a:prstDash val="dash"/>
+            <a:tailEnd type="triangle"/>
+          </a:ln>
+        </p:spPr>
+        <p:style>
+          <a:lnRef idx="1">
+            <a:schemeClr val="accent1"/>
+          </a:lnRef>
+          <a:fillRef idx="0">
+            <a:schemeClr val="accent1"/>
+          </a:fillRef>
+          <a:effectRef idx="0">
+            <a:schemeClr val="accent1"/>
+          </a:effectRef>
+          <a:fontRef idx="minor">
+            <a:schemeClr val="tx1"/>
+          </a:fontRef>
+        </p:style>
+      </p:cxnSp>
+      <mc:AlternateContent xmlns:mc="http://schemas.openxmlformats.org/markup-compatibility/2006">
+        <mc:Choice xmlns:a14="http://schemas.microsoft.com/office/drawing/2010/main" Requires="a14">
+          <p:sp>
+            <p:nvSpPr>
+              <p:cNvPr id="84" name="TextBox 83">
+                <a:extLst>
+                  <a:ext uri="{FF2B5EF4-FFF2-40B4-BE49-F238E27FC236}">
+                    <a16:creationId xmlns:a16="http://schemas.microsoft.com/office/drawing/2014/main" id="{F426921A-5266-4223-AF19-5678A01C1FA8}"/>
+                  </a:ext>
+                </a:extLst>
+              </p:cNvPr>
+              <p:cNvSpPr txBox="1"/>
+              <p:nvPr/>
+            </p:nvSpPr>
+            <p:spPr>
+              <a:xfrm>
+                <a:off x="9111860" y="3045968"/>
+                <a:ext cx="1163373" cy="369332"/>
+              </a:xfrm>
+              <a:prstGeom prst="rect">
+                <a:avLst/>
+              </a:prstGeom>
+              <a:noFill/>
+            </p:spPr>
+            <p:txBody>
+              <a:bodyPr wrap="square" rtlCol="0">
+                <a:spAutoFit/>
+              </a:bodyPr>
+              <a:lstStyle/>
+              <a:p>
+                <a:pPr/>
+                <a14:m>
+                  <m:oMathPara xmlns:m="http://schemas.openxmlformats.org/officeDocument/2006/math">
+                    <m:oMathParaPr>
+                      <m:jc m:val="centerGroup"/>
+                    </m:oMathParaPr>
+                    <m:oMath xmlns:m="http://schemas.openxmlformats.org/officeDocument/2006/math">
+                      <m:sSub>
+                        <m:sSubPr>
+                          <m:ctrlPr>
+                            <a:rPr lang="en-US" i="1" dirty="0" smtClean="0">
+                              <a:latin typeface="Cambria Math" panose="02040503050406030204" pitchFamily="18" charset="0"/>
+                            </a:rPr>
+                          </m:ctrlPr>
+                        </m:sSubPr>
+                        <m:e>
+                          <m:r>
+                            <a:rPr lang="en-US" i="1" dirty="0" smtClean="0">
+                              <a:latin typeface="Cambria Math" panose="02040503050406030204" pitchFamily="18" charset="0"/>
+                            </a:rPr>
+                            <m:t>𝑅</m:t>
+                          </m:r>
+                        </m:e>
+                        <m:sub>
+                          <m:r>
+                            <a:rPr lang="en-US" i="1" dirty="0" smtClean="0">
+                              <a:latin typeface="Cambria Math" panose="02040503050406030204" pitchFamily="18" charset="0"/>
+                            </a:rPr>
+                            <m:t>𝑋</m:t>
+                          </m:r>
+                        </m:sub>
+                      </m:sSub>
+                      <m:r>
+                        <a:rPr lang="en-US" i="1" dirty="0" smtClean="0">
+                          <a:latin typeface="Cambria Math" panose="02040503050406030204" pitchFamily="18" charset="0"/>
+                        </a:rPr>
+                        <m:t>(</m:t>
+                      </m:r>
+                      <m:r>
+                        <a:rPr lang="en-US" b="0" i="1" dirty="0" smtClean="0">
+                          <a:latin typeface="Cambria Math" panose="02040503050406030204" pitchFamily="18" charset="0"/>
+                        </a:rPr>
+                        <m:t>𝜓</m:t>
+                      </m:r>
+                      <m:r>
+                        <a:rPr lang="en-US" i="1" dirty="0" smtClean="0">
+                          <a:latin typeface="Cambria Math" panose="02040503050406030204" pitchFamily="18" charset="0"/>
+                        </a:rPr>
+                        <m:t>)</m:t>
+                      </m:r>
+                    </m:oMath>
+                  </m:oMathPara>
+                </a14:m>
+                <a:endParaRPr lang="en-US" dirty="0"/>
+              </a:p>
+            </p:txBody>
+          </p:sp>
+        </mc:Choice>
+        <mc:Fallback>
+          <p:sp>
+            <p:nvSpPr>
+              <p:cNvPr id="84" name="TextBox 83">
+                <a:extLst>
+                  <a:ext uri="{FF2B5EF4-FFF2-40B4-BE49-F238E27FC236}">
+                    <a16:creationId xmlns:a16="http://schemas.microsoft.com/office/drawing/2014/main" id="{F426921A-5266-4223-AF19-5678A01C1FA8}"/>
+                  </a:ext>
+                </a:extLst>
+              </p:cNvPr>
+              <p:cNvSpPr txBox="1">
+                <a:spLocks noRot="1" noChangeAspect="1" noMove="1" noResize="1" noEditPoints="1" noAdjustHandles="1" noChangeArrowheads="1" noChangeShapeType="1" noTextEdit="1"/>
+              </p:cNvSpPr>
+              <p:nvPr/>
+            </p:nvSpPr>
+            <p:spPr>
+              <a:xfrm>
+                <a:off x="9111860" y="3045968"/>
+                <a:ext cx="1163373" cy="369332"/>
+              </a:xfrm>
+              <a:prstGeom prst="rect">
+                <a:avLst/>
+              </a:prstGeom>
+              <a:blipFill>
+                <a:blip r:embed="rId5"/>
+                <a:stretch>
+                  <a:fillRect b="-13333"/>
+                </a:stretch>
+              </a:blipFill>
+            </p:spPr>
+            <p:txBody>
+              <a:bodyPr/>
+              <a:lstStyle/>
+              <a:p>
+                <a:r>
+                  <a:rPr lang="en-US">
+                    <a:noFill/>
+                  </a:rPr>
+                  <a:t> </a:t>
+                </a:r>
+              </a:p>
+            </p:txBody>
+          </p:sp>
+        </mc:Fallback>
+      </mc:AlternateContent>
+      <mc:AlternateContent xmlns:mc="http://schemas.openxmlformats.org/markup-compatibility/2006">
+        <mc:Choice xmlns:a14="http://schemas.microsoft.com/office/drawing/2010/main" Requires="a14">
+          <p:sp>
+            <p:nvSpPr>
+              <p:cNvPr id="85" name="TextBox 84">
+                <a:extLst>
+                  <a:ext uri="{FF2B5EF4-FFF2-40B4-BE49-F238E27FC236}">
+                    <a16:creationId xmlns:a16="http://schemas.microsoft.com/office/drawing/2014/main" id="{E08D9868-0D14-40FE-92DF-4B0824106E41}"/>
+                  </a:ext>
+                </a:extLst>
+              </p:cNvPr>
+              <p:cNvSpPr txBox="1"/>
+              <p:nvPr/>
+            </p:nvSpPr>
+            <p:spPr>
+              <a:xfrm>
+                <a:off x="7035697" y="3045968"/>
+                <a:ext cx="1163373" cy="369332"/>
+              </a:xfrm>
+              <a:prstGeom prst="rect">
+                <a:avLst/>
+              </a:prstGeom>
+              <a:noFill/>
+            </p:spPr>
+            <p:txBody>
+              <a:bodyPr wrap="square" rtlCol="0">
+                <a:spAutoFit/>
+              </a:bodyPr>
+              <a:lstStyle/>
+              <a:p>
+                <a:pPr/>
+                <a14:m>
+                  <m:oMathPara xmlns:m="http://schemas.openxmlformats.org/officeDocument/2006/math">
+                    <m:oMathParaPr>
+                      <m:jc m:val="centerGroup"/>
+                    </m:oMathParaPr>
+                    <m:oMath xmlns:m="http://schemas.openxmlformats.org/officeDocument/2006/math">
+                      <m:sSub>
+                        <m:sSubPr>
+                          <m:ctrlPr>
+                            <a:rPr lang="en-US" i="1" dirty="0" smtClean="0">
+                              <a:latin typeface="Cambria Math" panose="02040503050406030204" pitchFamily="18" charset="0"/>
+                            </a:rPr>
+                          </m:ctrlPr>
+                        </m:sSubPr>
+                        <m:e>
+                          <m:r>
+                            <a:rPr lang="en-US" i="1" dirty="0" smtClean="0">
+                              <a:latin typeface="Cambria Math" panose="02040503050406030204" pitchFamily="18" charset="0"/>
+                            </a:rPr>
+                            <m:t>𝑅</m:t>
+                          </m:r>
+                        </m:e>
+                        <m:sub>
+                          <m:r>
+                            <a:rPr lang="en-US" b="0" i="1" dirty="0" smtClean="0">
+                              <a:latin typeface="Cambria Math" panose="02040503050406030204" pitchFamily="18" charset="0"/>
+                            </a:rPr>
+                            <m:t>𝑌</m:t>
+                          </m:r>
+                        </m:sub>
+                      </m:sSub>
+                      <m:r>
+                        <a:rPr lang="en-US" i="1" dirty="0" smtClean="0">
+                          <a:latin typeface="Cambria Math" panose="02040503050406030204" pitchFamily="18" charset="0"/>
+                        </a:rPr>
+                        <m:t>(</m:t>
+                      </m:r>
+                      <m:r>
+                        <a:rPr lang="en-US" b="0" i="1" dirty="0" smtClean="0">
+                          <a:latin typeface="Cambria Math" panose="02040503050406030204" pitchFamily="18" charset="0"/>
+                        </a:rPr>
+                        <m:t>𝜃</m:t>
+                      </m:r>
+                      <m:r>
+                        <a:rPr lang="en-US" i="1" dirty="0" smtClean="0">
+                          <a:latin typeface="Cambria Math" panose="02040503050406030204" pitchFamily="18" charset="0"/>
+                        </a:rPr>
+                        <m:t>)</m:t>
+                      </m:r>
+                    </m:oMath>
+                  </m:oMathPara>
+                </a14:m>
+                <a:endParaRPr lang="en-US" dirty="0"/>
+              </a:p>
+            </p:txBody>
+          </p:sp>
+        </mc:Choice>
+        <mc:Fallback>
+          <p:sp>
+            <p:nvSpPr>
+              <p:cNvPr id="85" name="TextBox 84">
+                <a:extLst>
+                  <a:ext uri="{FF2B5EF4-FFF2-40B4-BE49-F238E27FC236}">
+                    <a16:creationId xmlns:a16="http://schemas.microsoft.com/office/drawing/2014/main" id="{E08D9868-0D14-40FE-92DF-4B0824106E41}"/>
+                  </a:ext>
+                </a:extLst>
+              </p:cNvPr>
+              <p:cNvSpPr txBox="1">
+                <a:spLocks noRot="1" noChangeAspect="1" noMove="1" noResize="1" noEditPoints="1" noAdjustHandles="1" noChangeArrowheads="1" noChangeShapeType="1" noTextEdit="1"/>
+              </p:cNvSpPr>
+              <p:nvPr/>
+            </p:nvSpPr>
+            <p:spPr>
+              <a:xfrm>
+                <a:off x="7035697" y="3045968"/>
+                <a:ext cx="1163373" cy="369332"/>
+              </a:xfrm>
+              <a:prstGeom prst="rect">
+                <a:avLst/>
+              </a:prstGeom>
+              <a:blipFill>
+                <a:blip r:embed="rId6"/>
+                <a:stretch>
+                  <a:fillRect b="-13333"/>
+                </a:stretch>
+              </a:blipFill>
+            </p:spPr>
+            <p:txBody>
+              <a:bodyPr/>
+              <a:lstStyle/>
+              <a:p>
+                <a:r>
+                  <a:rPr lang="en-US">
+                    <a:noFill/>
+                  </a:rPr>
+                  <a:t> </a:t>
+                </a:r>
+              </a:p>
+            </p:txBody>
+          </p:sp>
+        </mc:Fallback>
+      </mc:AlternateContent>
+      <mc:AlternateContent xmlns:mc="http://schemas.openxmlformats.org/markup-compatibility/2006">
+        <mc:Choice xmlns:a14="http://schemas.microsoft.com/office/drawing/2010/main" Requires="a14">
+          <p:sp>
+            <p:nvSpPr>
+              <p:cNvPr id="86" name="TextBox 85">
+                <a:extLst>
+                  <a:ext uri="{FF2B5EF4-FFF2-40B4-BE49-F238E27FC236}">
+                    <a16:creationId xmlns:a16="http://schemas.microsoft.com/office/drawing/2014/main" id="{FB259F81-3A34-4C64-8680-73C8A62278D4}"/>
+                  </a:ext>
+                </a:extLst>
+              </p:cNvPr>
+              <p:cNvSpPr txBox="1"/>
+              <p:nvPr/>
+            </p:nvSpPr>
+            <p:spPr>
+              <a:xfrm>
+                <a:off x="4710577" y="3045968"/>
+                <a:ext cx="1163373" cy="369332"/>
+              </a:xfrm>
+              <a:prstGeom prst="rect">
+                <a:avLst/>
+              </a:prstGeom>
+              <a:noFill/>
+            </p:spPr>
+            <p:txBody>
+              <a:bodyPr wrap="square" rtlCol="0">
+                <a:spAutoFit/>
+              </a:bodyPr>
+              <a:lstStyle/>
+              <a:p>
+                <a:pPr/>
+                <a14:m>
+                  <m:oMathPara xmlns:m="http://schemas.openxmlformats.org/officeDocument/2006/math">
+                    <m:oMathParaPr>
+                      <m:jc m:val="centerGroup"/>
+                    </m:oMathParaPr>
+                    <m:oMath xmlns:m="http://schemas.openxmlformats.org/officeDocument/2006/math">
+                      <m:sSub>
+                        <m:sSubPr>
+                          <m:ctrlPr>
+                            <a:rPr lang="en-US" i="1" dirty="0" smtClean="0">
+                              <a:latin typeface="Cambria Math" panose="02040503050406030204" pitchFamily="18" charset="0"/>
+                            </a:rPr>
+                          </m:ctrlPr>
+                        </m:sSubPr>
+                        <m:e>
+                          <m:r>
+                            <a:rPr lang="en-US" i="1" dirty="0" smtClean="0">
+                              <a:latin typeface="Cambria Math" panose="02040503050406030204" pitchFamily="18" charset="0"/>
+                            </a:rPr>
+                            <m:t>𝑅</m:t>
+                          </m:r>
+                        </m:e>
+                        <m:sub>
+                          <m:r>
+                            <a:rPr lang="en-US" b="0" i="1" dirty="0" smtClean="0">
+                              <a:latin typeface="Cambria Math" panose="02040503050406030204" pitchFamily="18" charset="0"/>
+                            </a:rPr>
+                            <m:t>𝑍</m:t>
+                          </m:r>
+                        </m:sub>
+                      </m:sSub>
+                      <m:r>
+                        <a:rPr lang="en-US" i="1" dirty="0" smtClean="0">
+                          <a:latin typeface="Cambria Math" panose="02040503050406030204" pitchFamily="18" charset="0"/>
+                        </a:rPr>
+                        <m:t>(</m:t>
+                      </m:r>
+                      <m:r>
+                        <a:rPr lang="en-US" b="0" i="1" dirty="0" smtClean="0">
+                          <a:latin typeface="Cambria Math" panose="02040503050406030204" pitchFamily="18" charset="0"/>
+                        </a:rPr>
+                        <m:t>𝜙</m:t>
+                      </m:r>
+                      <m:r>
+                        <a:rPr lang="en-US" i="1" dirty="0" smtClean="0">
+                          <a:latin typeface="Cambria Math" panose="02040503050406030204" pitchFamily="18" charset="0"/>
+                        </a:rPr>
+                        <m:t>)</m:t>
+                      </m:r>
+                    </m:oMath>
+                  </m:oMathPara>
+                </a14:m>
+                <a:endParaRPr lang="en-US" dirty="0"/>
+              </a:p>
+            </p:txBody>
+          </p:sp>
+        </mc:Choice>
+        <mc:Fallback>
+          <p:sp>
+            <p:nvSpPr>
+              <p:cNvPr id="86" name="TextBox 85">
+                <a:extLst>
+                  <a:ext uri="{FF2B5EF4-FFF2-40B4-BE49-F238E27FC236}">
+                    <a16:creationId xmlns:a16="http://schemas.microsoft.com/office/drawing/2014/main" id="{FB259F81-3A34-4C64-8680-73C8A62278D4}"/>
+                  </a:ext>
+                </a:extLst>
+              </p:cNvPr>
+              <p:cNvSpPr txBox="1">
+                <a:spLocks noRot="1" noChangeAspect="1" noMove="1" noResize="1" noEditPoints="1" noAdjustHandles="1" noChangeArrowheads="1" noChangeShapeType="1" noTextEdit="1"/>
+              </p:cNvSpPr>
+              <p:nvPr/>
+            </p:nvSpPr>
+            <p:spPr>
+              <a:xfrm>
+                <a:off x="4710577" y="3045968"/>
+                <a:ext cx="1163373" cy="369332"/>
+              </a:xfrm>
+              <a:prstGeom prst="rect">
+                <a:avLst/>
+              </a:prstGeom>
+              <a:blipFill>
+                <a:blip r:embed="rId7"/>
+                <a:stretch>
+                  <a:fillRect b="-13333"/>
+                </a:stretch>
+              </a:blipFill>
+            </p:spPr>
+            <p:txBody>
+              <a:bodyPr/>
+              <a:lstStyle/>
+              <a:p>
+                <a:r>
+                  <a:rPr lang="en-US">
+                    <a:noFill/>
+                  </a:rPr>
+                  <a:t> </a:t>
+                </a:r>
+              </a:p>
+            </p:txBody>
+          </p:sp>
+        </mc:Fallback>
+      </mc:AlternateContent>
+      <p:sp>
+        <p:nvSpPr>
+          <p:cNvPr id="88" name="Arc 87">
+            <a:extLst>
+              <a:ext uri="{FF2B5EF4-FFF2-40B4-BE49-F238E27FC236}">
+                <a16:creationId xmlns:a16="http://schemas.microsoft.com/office/drawing/2014/main" id="{534C80AC-BB09-4B8F-856B-25CDA5F060A5}"/>
+              </a:ext>
+            </a:extLst>
+          </p:cNvPr>
+          <p:cNvSpPr/>
+          <p:nvPr/>
+        </p:nvSpPr>
+        <p:spPr>
+          <a:xfrm>
+            <a:off x="4560753" y="3633632"/>
+            <a:ext cx="421663" cy="234259"/>
+          </a:xfrm>
+          <a:prstGeom prst="arc">
+            <a:avLst>
+              <a:gd name="adj1" fmla="val 4620672"/>
+              <a:gd name="adj2" fmla="val 13265520"/>
+            </a:avLst>
+          </a:prstGeom>
+          <a:ln>
+            <a:solidFill>
+              <a:schemeClr val="tx1"/>
+            </a:solidFill>
+            <a:headEnd type="none" w="med" len="med"/>
+            <a:tailEnd type="arrow" w="med" len="med"/>
+          </a:ln>
+        </p:spPr>
+        <p:style>
+          <a:lnRef idx="1">
+            <a:schemeClr val="accent1"/>
+          </a:lnRef>
+          <a:fillRef idx="0">
+            <a:schemeClr val="accent1"/>
+          </a:fillRef>
+          <a:effectRef idx="0">
+            <a:schemeClr val="accent1"/>
+          </a:effectRef>
+          <a:fontRef idx="minor">
+            <a:schemeClr val="tx1"/>
+          </a:fontRef>
+        </p:style>
+        <p:txBody>
+          <a:bodyPr rtlCol="0" anchor="ctr"/>
+          <a:lstStyle/>
+          <a:p>
+            <a:pPr algn="ctr"/>
+            <a:endParaRPr lang="en-US"/>
+          </a:p>
+        </p:txBody>
+      </p:sp>
+      <p:cxnSp>
+        <p:nvCxnSpPr>
+          <p:cNvPr id="94" name="Straight Arrow Connector 93">
+            <a:extLst>
+              <a:ext uri="{FF2B5EF4-FFF2-40B4-BE49-F238E27FC236}">
+                <a16:creationId xmlns:a16="http://schemas.microsoft.com/office/drawing/2014/main" id="{9A0BE6EF-87F1-4534-AF96-74193C2BC61F}"/>
+              </a:ext>
+            </a:extLst>
+          </p:cNvPr>
+          <p:cNvCxnSpPr/>
+          <p:nvPr/>
+        </p:nvCxnSpPr>
+        <p:spPr>
+          <a:xfrm rot="5400000" flipV="1">
+            <a:off x="5354516" y="3949839"/>
+            <a:ext cx="0" cy="1062182"/>
+          </a:xfrm>
+          <a:prstGeom prst="straightConnector1">
+            <a:avLst/>
+          </a:prstGeom>
+          <a:ln w="12700">
+            <a:solidFill>
+              <a:schemeClr val="tx1"/>
+            </a:solidFill>
+            <a:prstDash val="dash"/>
+            <a:tailEnd type="triangle"/>
+          </a:ln>
+        </p:spPr>
+        <p:style>
+          <a:lnRef idx="1">
+            <a:schemeClr val="accent1"/>
+          </a:lnRef>
+          <a:fillRef idx="0">
+            <a:schemeClr val="accent1"/>
+          </a:fillRef>
+          <a:effectRef idx="0">
+            <a:schemeClr val="accent1"/>
+          </a:effectRef>
+          <a:fontRef idx="minor">
+            <a:schemeClr val="tx1"/>
+          </a:fontRef>
+        </p:style>
+      </p:cxnSp>
+      <p:cxnSp>
+        <p:nvCxnSpPr>
+          <p:cNvPr id="95" name="Straight Arrow Connector 94">
+            <a:extLst>
+              <a:ext uri="{FF2B5EF4-FFF2-40B4-BE49-F238E27FC236}">
+                <a16:creationId xmlns:a16="http://schemas.microsoft.com/office/drawing/2014/main" id="{D5875EAE-54E0-4AF2-A10D-3DE38334D1EE}"/>
+              </a:ext>
+            </a:extLst>
+          </p:cNvPr>
+          <p:cNvCxnSpPr>
+            <a:cxnSpLocks/>
+          </p:cNvCxnSpPr>
+          <p:nvPr/>
+        </p:nvCxnSpPr>
+        <p:spPr>
+          <a:xfrm flipV="1">
+            <a:off x="7143196" y="4344109"/>
+            <a:ext cx="1106166" cy="128844"/>
+          </a:xfrm>
+          <a:prstGeom prst="straightConnector1">
+            <a:avLst/>
+          </a:prstGeom>
+          <a:ln w="28575">
+            <a:solidFill>
+              <a:srgbClr val="00B050"/>
+            </a:solidFill>
+            <a:tailEnd type="triangle"/>
+          </a:ln>
+        </p:spPr>
+        <p:style>
+          <a:lnRef idx="1">
+            <a:schemeClr val="accent1"/>
+          </a:lnRef>
+          <a:fillRef idx="0">
+            <a:schemeClr val="accent1"/>
+          </a:fillRef>
+          <a:effectRef idx="0">
+            <a:schemeClr val="accent1"/>
+          </a:effectRef>
+          <a:fontRef idx="minor">
+            <a:schemeClr val="tx1"/>
+          </a:fontRef>
+        </p:style>
+      </p:cxnSp>
+      <p:cxnSp>
+        <p:nvCxnSpPr>
+          <p:cNvPr id="99" name="Straight Arrow Connector 98">
+            <a:extLst>
+              <a:ext uri="{FF2B5EF4-FFF2-40B4-BE49-F238E27FC236}">
+                <a16:creationId xmlns:a16="http://schemas.microsoft.com/office/drawing/2014/main" id="{F692BDDB-7F86-447F-AAFC-66219E827813}"/>
+              </a:ext>
+            </a:extLst>
+          </p:cNvPr>
+          <p:cNvCxnSpPr>
+            <a:cxnSpLocks/>
+          </p:cNvCxnSpPr>
+          <p:nvPr/>
+        </p:nvCxnSpPr>
+        <p:spPr>
+          <a:xfrm flipH="1" flipV="1">
+            <a:off x="7147968" y="3442701"/>
+            <a:ext cx="5011" cy="1045801"/>
+          </a:xfrm>
+          <a:prstGeom prst="straightConnector1">
+            <a:avLst/>
+          </a:prstGeom>
+          <a:ln w="12700">
+            <a:solidFill>
+              <a:srgbClr val="0070C0"/>
+            </a:solidFill>
+            <a:prstDash val="dash"/>
+            <a:tailEnd type="triangle"/>
+          </a:ln>
+        </p:spPr>
+        <p:style>
+          <a:lnRef idx="1">
+            <a:schemeClr val="accent1"/>
+          </a:lnRef>
+          <a:fillRef idx="0">
+            <a:schemeClr val="accent1"/>
+          </a:fillRef>
+          <a:effectRef idx="0">
+            <a:schemeClr val="accent1"/>
+          </a:effectRef>
+          <a:fontRef idx="minor">
+            <a:schemeClr val="tx1"/>
+          </a:fontRef>
+        </p:style>
+      </p:cxnSp>
+      <p:cxnSp>
+        <p:nvCxnSpPr>
+          <p:cNvPr id="100" name="Straight Arrow Connector 99">
+            <a:extLst>
+              <a:ext uri="{FF2B5EF4-FFF2-40B4-BE49-F238E27FC236}">
+                <a16:creationId xmlns:a16="http://schemas.microsoft.com/office/drawing/2014/main" id="{0F53D442-8B08-4788-847A-C6C3870D7130}"/>
+              </a:ext>
+            </a:extLst>
+          </p:cNvPr>
+          <p:cNvCxnSpPr>
+            <a:cxnSpLocks/>
+          </p:cNvCxnSpPr>
+          <p:nvPr/>
+        </p:nvCxnSpPr>
+        <p:spPr>
+          <a:xfrm>
+            <a:off x="7152978" y="4488502"/>
+            <a:ext cx="202975" cy="522037"/>
+          </a:xfrm>
+          <a:prstGeom prst="straightConnector1">
+            <a:avLst/>
+          </a:prstGeom>
+          <a:ln w="12700">
+            <a:solidFill>
+              <a:srgbClr val="FF0000"/>
+            </a:solidFill>
+            <a:prstDash val="dash"/>
+            <a:tailEnd type="triangle"/>
+          </a:ln>
+        </p:spPr>
+        <p:style>
+          <a:lnRef idx="1">
+            <a:schemeClr val="accent1"/>
+          </a:lnRef>
+          <a:fillRef idx="0">
+            <a:schemeClr val="accent1"/>
+          </a:fillRef>
+          <a:effectRef idx="0">
+            <a:schemeClr val="accent1"/>
+          </a:effectRef>
+          <a:fontRef idx="minor">
+            <a:schemeClr val="tx1"/>
+          </a:fontRef>
+        </p:style>
+      </p:cxnSp>
+      <p:sp>
+        <p:nvSpPr>
+          <p:cNvPr id="82" name="Arc 81">
+            <a:extLst>
+              <a:ext uri="{FF2B5EF4-FFF2-40B4-BE49-F238E27FC236}">
+                <a16:creationId xmlns:a16="http://schemas.microsoft.com/office/drawing/2014/main" id="{269054A4-A49E-4183-BA58-EC70FA5CAEFB}"/>
+              </a:ext>
+            </a:extLst>
+          </p:cNvPr>
+          <p:cNvSpPr/>
+          <p:nvPr/>
+        </p:nvSpPr>
+        <p:spPr>
+          <a:xfrm>
+            <a:off x="7800960" y="4238153"/>
+            <a:ext cx="273148" cy="297498"/>
+          </a:xfrm>
+          <a:prstGeom prst="arc">
+            <a:avLst>
+              <a:gd name="adj1" fmla="val 11822294"/>
+              <a:gd name="adj2" fmla="val 21563244"/>
+            </a:avLst>
+          </a:prstGeom>
+          <a:ln>
+            <a:solidFill>
+              <a:schemeClr val="tx1"/>
+            </a:solidFill>
+            <a:headEnd type="arrow" w="med" len="med"/>
+            <a:tailEnd type="none" w="med" len="med"/>
+          </a:ln>
+        </p:spPr>
+        <p:style>
+          <a:lnRef idx="1">
+            <a:schemeClr val="accent1"/>
+          </a:lnRef>
+          <a:fillRef idx="0">
+            <a:schemeClr val="accent1"/>
+          </a:fillRef>
+          <a:effectRef idx="0">
+            <a:schemeClr val="accent1"/>
+          </a:effectRef>
+          <a:fontRef idx="minor">
+            <a:schemeClr val="tx1"/>
+          </a:fontRef>
+        </p:style>
+        <p:txBody>
+          <a:bodyPr rtlCol="0" anchor="ctr"/>
+          <a:lstStyle/>
+          <a:p>
+            <a:pPr algn="ctr"/>
+            <a:endParaRPr lang="en-US"/>
+          </a:p>
+        </p:txBody>
+      </p:sp>
+      <p:cxnSp>
+        <p:nvCxnSpPr>
+          <p:cNvPr id="101" name="Straight Arrow Connector 100">
+            <a:extLst>
+              <a:ext uri="{FF2B5EF4-FFF2-40B4-BE49-F238E27FC236}">
+                <a16:creationId xmlns:a16="http://schemas.microsoft.com/office/drawing/2014/main" id="{34AFA6C8-8C6A-4E68-8C4A-32B456A648E2}"/>
+              </a:ext>
+            </a:extLst>
+          </p:cNvPr>
+          <p:cNvCxnSpPr/>
+          <p:nvPr/>
+        </p:nvCxnSpPr>
+        <p:spPr>
+          <a:xfrm flipH="1" flipV="1">
+            <a:off x="6822312" y="3705111"/>
+            <a:ext cx="347168" cy="786735"/>
+          </a:xfrm>
+          <a:prstGeom prst="straightConnector1">
+            <a:avLst/>
+          </a:prstGeom>
+          <a:ln w="28575">
+            <a:solidFill>
+              <a:srgbClr val="FF0000"/>
+            </a:solidFill>
+            <a:tailEnd type="triangle"/>
+          </a:ln>
+        </p:spPr>
+        <p:style>
+          <a:lnRef idx="1">
+            <a:schemeClr val="accent1"/>
+          </a:lnRef>
+          <a:fillRef idx="0">
+            <a:schemeClr val="accent1"/>
+          </a:fillRef>
+          <a:effectRef idx="0">
+            <a:schemeClr val="accent1"/>
+          </a:effectRef>
+          <a:fontRef idx="minor">
+            <a:schemeClr val="tx1"/>
+          </a:fontRef>
+        </p:style>
+      </p:cxnSp>
+      <p:cxnSp>
+        <p:nvCxnSpPr>
+          <p:cNvPr id="103" name="Straight Arrow Connector 102">
+            <a:extLst>
+              <a:ext uri="{FF2B5EF4-FFF2-40B4-BE49-F238E27FC236}">
+                <a16:creationId xmlns:a16="http://schemas.microsoft.com/office/drawing/2014/main" id="{50713C68-6211-4A14-B0C8-F58B705387E6}"/>
+              </a:ext>
+            </a:extLst>
+          </p:cNvPr>
+          <p:cNvCxnSpPr>
+            <a:cxnSpLocks/>
+          </p:cNvCxnSpPr>
+          <p:nvPr/>
+        </p:nvCxnSpPr>
+        <p:spPr>
+          <a:xfrm flipV="1">
+            <a:off x="9282129" y="4291204"/>
+            <a:ext cx="546099" cy="200340"/>
+          </a:xfrm>
+          <a:prstGeom prst="straightConnector1">
+            <a:avLst/>
+          </a:prstGeom>
+          <a:ln w="12700">
+            <a:solidFill>
+              <a:srgbClr val="0070C0"/>
+            </a:solidFill>
+            <a:prstDash val="dash"/>
+            <a:tailEnd type="triangle"/>
+          </a:ln>
+        </p:spPr>
+        <p:style>
+          <a:lnRef idx="1">
+            <a:schemeClr val="accent1"/>
+          </a:lnRef>
+          <a:fillRef idx="0">
+            <a:schemeClr val="accent1"/>
+          </a:fillRef>
+          <a:effectRef idx="0">
+            <a:schemeClr val="accent1"/>
+          </a:effectRef>
+          <a:fontRef idx="minor">
+            <a:schemeClr val="tx1"/>
+          </a:fontRef>
+        </p:style>
+      </p:cxnSp>
+      <p:cxnSp>
+        <p:nvCxnSpPr>
+          <p:cNvPr id="104" name="Straight Arrow Connector 103">
+            <a:extLst>
+              <a:ext uri="{FF2B5EF4-FFF2-40B4-BE49-F238E27FC236}">
+                <a16:creationId xmlns:a16="http://schemas.microsoft.com/office/drawing/2014/main" id="{9834E47C-B3A6-4D50-A572-37A6221640FC}"/>
+              </a:ext>
+            </a:extLst>
+          </p:cNvPr>
+          <p:cNvCxnSpPr>
+            <a:cxnSpLocks/>
+          </p:cNvCxnSpPr>
+          <p:nvPr/>
+        </p:nvCxnSpPr>
+        <p:spPr>
+          <a:xfrm flipV="1">
+            <a:off x="9275145" y="4354271"/>
+            <a:ext cx="1106166" cy="128844"/>
+          </a:xfrm>
+          <a:prstGeom prst="straightConnector1">
+            <a:avLst/>
+          </a:prstGeom>
+          <a:ln w="12700">
+            <a:solidFill>
+              <a:srgbClr val="00B050"/>
+            </a:solidFill>
+            <a:prstDash val="dash"/>
+            <a:tailEnd type="triangle"/>
+          </a:ln>
+        </p:spPr>
+        <p:style>
+          <a:lnRef idx="1">
+            <a:schemeClr val="accent1"/>
+          </a:lnRef>
+          <a:fillRef idx="0">
+            <a:schemeClr val="accent1"/>
+          </a:fillRef>
+          <a:effectRef idx="0">
+            <a:schemeClr val="accent1"/>
+          </a:effectRef>
+          <a:fontRef idx="minor">
+            <a:schemeClr val="tx1"/>
+          </a:fontRef>
+        </p:style>
+      </p:cxnSp>
+      <p:cxnSp>
+        <p:nvCxnSpPr>
+          <p:cNvPr id="105" name="Straight Arrow Connector 104">
+            <a:extLst>
+              <a:ext uri="{FF2B5EF4-FFF2-40B4-BE49-F238E27FC236}">
+                <a16:creationId xmlns:a16="http://schemas.microsoft.com/office/drawing/2014/main" id="{19E56CE4-2A15-4079-9EA9-F0873AB49B12}"/>
+              </a:ext>
+            </a:extLst>
+          </p:cNvPr>
+          <p:cNvCxnSpPr/>
+          <p:nvPr/>
+        </p:nvCxnSpPr>
+        <p:spPr>
+          <a:xfrm flipH="1" flipV="1">
+            <a:off x="8954261" y="3715273"/>
+            <a:ext cx="347168" cy="786735"/>
+          </a:xfrm>
+          <a:prstGeom prst="straightConnector1">
+            <a:avLst/>
+          </a:prstGeom>
+          <a:ln w="28575">
+            <a:solidFill>
+              <a:srgbClr val="FF0000"/>
+            </a:solidFill>
+            <a:tailEnd type="triangle"/>
+          </a:ln>
+        </p:spPr>
+        <p:style>
+          <a:lnRef idx="1">
+            <a:schemeClr val="accent1"/>
+          </a:lnRef>
+          <a:fillRef idx="0">
+            <a:schemeClr val="accent1"/>
+          </a:fillRef>
+          <a:effectRef idx="0">
+            <a:schemeClr val="accent1"/>
+          </a:effectRef>
+          <a:fontRef idx="minor">
+            <a:schemeClr val="tx1"/>
+          </a:fontRef>
+        </p:style>
+      </p:cxnSp>
+      <p:sp>
+        <p:nvSpPr>
+          <p:cNvPr id="106" name="Arc 105">
+            <a:extLst>
+              <a:ext uri="{FF2B5EF4-FFF2-40B4-BE49-F238E27FC236}">
+                <a16:creationId xmlns:a16="http://schemas.microsoft.com/office/drawing/2014/main" id="{BD41B77A-35E0-44DF-829A-862D7F3C3E7D}"/>
+              </a:ext>
+            </a:extLst>
+          </p:cNvPr>
+          <p:cNvSpPr/>
+          <p:nvPr/>
+        </p:nvSpPr>
+        <p:spPr>
+          <a:xfrm rot="3774699">
+            <a:off x="8847456" y="3597165"/>
+            <a:ext cx="301400" cy="572512"/>
+          </a:xfrm>
+          <a:prstGeom prst="arc">
+            <a:avLst>
+              <a:gd name="adj1" fmla="val 17075382"/>
+              <a:gd name="adj2" fmla="val 562608"/>
+            </a:avLst>
+          </a:prstGeom>
+          <a:ln>
+            <a:solidFill>
+              <a:schemeClr val="tx1"/>
+            </a:solidFill>
+            <a:headEnd type="arrow" w="med" len="med"/>
+            <a:tailEnd type="none" w="med" len="med"/>
+          </a:ln>
+        </p:spPr>
+        <p:style>
+          <a:lnRef idx="1">
+            <a:schemeClr val="accent1"/>
+          </a:lnRef>
+          <a:fillRef idx="0">
+            <a:schemeClr val="accent1"/>
+          </a:fillRef>
+          <a:effectRef idx="0">
+            <a:schemeClr val="accent1"/>
+          </a:effectRef>
+          <a:fontRef idx="minor">
+            <a:schemeClr val="tx1"/>
+          </a:fontRef>
+        </p:style>
+        <p:txBody>
+          <a:bodyPr rtlCol="0" anchor="ctr"/>
+          <a:lstStyle/>
+          <a:p>
+            <a:pPr algn="ctr"/>
+            <a:endParaRPr lang="en-US"/>
+          </a:p>
+        </p:txBody>
+      </p:sp>
+      <p:cxnSp>
+        <p:nvCxnSpPr>
+          <p:cNvPr id="110" name="Straight Arrow Connector 109">
+            <a:extLst>
+              <a:ext uri="{FF2B5EF4-FFF2-40B4-BE49-F238E27FC236}">
+                <a16:creationId xmlns:a16="http://schemas.microsoft.com/office/drawing/2014/main" id="{60CAC307-E5ED-4BCF-9471-4C872B1CBC35}"/>
+              </a:ext>
+            </a:extLst>
+          </p:cNvPr>
+          <p:cNvCxnSpPr/>
+          <p:nvPr/>
+        </p:nvCxnSpPr>
+        <p:spPr>
+          <a:xfrm flipV="1">
+            <a:off x="9297602" y="3812307"/>
+            <a:ext cx="219621" cy="700497"/>
+          </a:xfrm>
+          <a:prstGeom prst="straightConnector1">
+            <a:avLst/>
+          </a:prstGeom>
+          <a:ln w="28575">
+            <a:solidFill>
+              <a:srgbClr val="0070C0"/>
+            </a:solidFill>
+            <a:tailEnd type="triangle"/>
+          </a:ln>
+        </p:spPr>
+        <p:style>
+          <a:lnRef idx="1">
+            <a:schemeClr val="accent1"/>
+          </a:lnRef>
+          <a:fillRef idx="0">
+            <a:schemeClr val="accent1"/>
+          </a:fillRef>
+          <a:effectRef idx="0">
+            <a:schemeClr val="accent1"/>
+          </a:effectRef>
+          <a:fontRef idx="minor">
+            <a:schemeClr val="tx1"/>
+          </a:fontRef>
+        </p:style>
+      </p:cxnSp>
+      <p:cxnSp>
+        <p:nvCxnSpPr>
+          <p:cNvPr id="111" name="Straight Arrow Connector 110">
+            <a:extLst>
+              <a:ext uri="{FF2B5EF4-FFF2-40B4-BE49-F238E27FC236}">
+                <a16:creationId xmlns:a16="http://schemas.microsoft.com/office/drawing/2014/main" id="{92C7CE19-3813-4743-999E-F47B8F810CCB}"/>
+              </a:ext>
+            </a:extLst>
+          </p:cNvPr>
+          <p:cNvCxnSpPr/>
+          <p:nvPr/>
+        </p:nvCxnSpPr>
+        <p:spPr>
+          <a:xfrm flipV="1">
+            <a:off x="9297600" y="4073394"/>
+            <a:ext cx="923634" cy="439412"/>
+          </a:xfrm>
+          <a:prstGeom prst="straightConnector1">
+            <a:avLst/>
+          </a:prstGeom>
+          <a:ln w="28575">
+            <a:solidFill>
+              <a:srgbClr val="00B050"/>
+            </a:solidFill>
+            <a:tailEnd type="triangle"/>
+          </a:ln>
+        </p:spPr>
+        <p:style>
+          <a:lnRef idx="1">
+            <a:schemeClr val="accent1"/>
+          </a:lnRef>
+          <a:fillRef idx="0">
+            <a:schemeClr val="accent1"/>
+          </a:fillRef>
+          <a:effectRef idx="0">
+            <a:schemeClr val="accent1"/>
+          </a:effectRef>
+          <a:fontRef idx="minor">
+            <a:schemeClr val="tx1"/>
+          </a:fontRef>
+        </p:style>
+      </p:cxnSp>
+      <p:sp>
+        <p:nvSpPr>
+          <p:cNvPr id="112" name="TextBox 111">
+            <a:extLst>
+              <a:ext uri="{FF2B5EF4-FFF2-40B4-BE49-F238E27FC236}">
+                <a16:creationId xmlns:a16="http://schemas.microsoft.com/office/drawing/2014/main" id="{43890AFE-62C3-4823-B6E1-43F0017A390F}"/>
+              </a:ext>
+            </a:extLst>
+          </p:cNvPr>
+          <p:cNvSpPr txBox="1"/>
+          <p:nvPr/>
+        </p:nvSpPr>
+        <p:spPr>
+          <a:xfrm>
+            <a:off x="10248057" y="3873300"/>
+            <a:ext cx="594139" cy="369332"/>
+          </a:xfrm>
+          <a:prstGeom prst="rect">
+            <a:avLst/>
+          </a:prstGeom>
+          <a:noFill/>
+        </p:spPr>
+        <p:txBody>
+          <a:bodyPr wrap="square" rtlCol="0">
+            <a:spAutoFit/>
+          </a:bodyPr>
+          <a:lstStyle/>
+          <a:p>
+            <a:r>
+              <a:rPr lang="en-US" dirty="0"/>
+              <a:t>Y’’’</a:t>
+            </a:r>
+          </a:p>
+        </p:txBody>
+      </p:sp>
+      <p:sp>
+        <p:nvSpPr>
+          <p:cNvPr id="113" name="TextBox 112">
+            <a:extLst>
+              <a:ext uri="{FF2B5EF4-FFF2-40B4-BE49-F238E27FC236}">
+                <a16:creationId xmlns:a16="http://schemas.microsoft.com/office/drawing/2014/main" id="{CE500625-9D13-40BD-A813-24024ECAD649}"/>
+              </a:ext>
+            </a:extLst>
+          </p:cNvPr>
+          <p:cNvSpPr txBox="1"/>
+          <p:nvPr/>
+        </p:nvSpPr>
+        <p:spPr>
+          <a:xfrm>
+            <a:off x="9529970" y="3523832"/>
+            <a:ext cx="517603" cy="369332"/>
+          </a:xfrm>
+          <a:prstGeom prst="rect">
+            <a:avLst/>
+          </a:prstGeom>
+          <a:noFill/>
+        </p:spPr>
+        <p:txBody>
+          <a:bodyPr wrap="square" rtlCol="0">
+            <a:spAutoFit/>
+          </a:bodyPr>
+          <a:lstStyle/>
+          <a:p>
+            <a:r>
+              <a:rPr lang="en-US" dirty="0"/>
+              <a:t>Z’’’</a:t>
+            </a:r>
+          </a:p>
+        </p:txBody>
+      </p:sp>
+      <p:sp>
+        <p:nvSpPr>
+          <p:cNvPr id="115" name="TextBox 114">
+            <a:extLst>
+              <a:ext uri="{FF2B5EF4-FFF2-40B4-BE49-F238E27FC236}">
+                <a16:creationId xmlns:a16="http://schemas.microsoft.com/office/drawing/2014/main" id="{AE7EC66F-DEC1-40E9-BCE3-1C235EDB9B05}"/>
+              </a:ext>
+            </a:extLst>
+          </p:cNvPr>
+          <p:cNvSpPr txBox="1"/>
+          <p:nvPr/>
+        </p:nvSpPr>
+        <p:spPr>
+          <a:xfrm>
+            <a:off x="8683202" y="3415300"/>
+            <a:ext cx="488878" cy="369332"/>
+          </a:xfrm>
+          <a:prstGeom prst="rect">
+            <a:avLst/>
+          </a:prstGeom>
+          <a:noFill/>
+        </p:spPr>
+        <p:txBody>
+          <a:bodyPr wrap="square" rtlCol="0">
+            <a:spAutoFit/>
+          </a:bodyPr>
+          <a:lstStyle/>
+          <a:p>
+            <a:r>
+              <a:rPr lang="en-US" dirty="0"/>
+              <a:t>X’’’</a:t>
+            </a:r>
           </a:p>
         </p:txBody>
       </p:sp>
@@ -12158,8 +13964,8 @@
           </a:p>
         </p:txBody>
       </p:sp>
-      <mc:AlternateContent xmlns:mc="http://schemas.openxmlformats.org/markup-compatibility/2006">
-        <mc:Choice xmlns:a14="http://schemas.microsoft.com/office/drawing/2010/main" Requires="a14">
+      <mc:AlternateContent xmlns:mc="http://schemas.openxmlformats.org/markup-compatibility/2006" xmlns:a14="http://schemas.microsoft.com/office/drawing/2010/main">
+        <mc:Choice Requires="a14">
           <p:sp>
             <p:nvSpPr>
               <p:cNvPr id="12" name="TextBox 11"/>
@@ -12182,6 +13988,7 @@
               </a:bodyPr>
               <a:lstStyle/>
               <a:p>
+                <a:pPr/>
                 <a14:m>
                   <m:oMathPara xmlns:m="http://schemas.openxmlformats.org/officeDocument/2006/math">
                     <m:oMathParaPr>
@@ -12202,7 +14009,7 @@
             </p:txBody>
           </p:sp>
         </mc:Choice>
-        <mc:Fallback>
+        <mc:Fallback xmlns="">
           <p:sp>
             <p:nvSpPr>
               <p:cNvPr id="12" name="TextBox 11"/>
@@ -12635,8 +14442,8 @@
           </a:p>
         </p:txBody>
       </p:sp>
-      <mc:AlternateContent xmlns:mc="http://schemas.openxmlformats.org/markup-compatibility/2006">
-        <mc:Choice xmlns:a14="http://schemas.microsoft.com/office/drawing/2010/main" Requires="a14">
+      <mc:AlternateContent xmlns:mc="http://schemas.openxmlformats.org/markup-compatibility/2006" xmlns:a14="http://schemas.microsoft.com/office/drawing/2010/main">
+        <mc:Choice Requires="a14">
           <p:sp>
             <p:nvSpPr>
               <p:cNvPr id="23" name="TextBox 22"/>
@@ -12659,6 +14466,7 @@
               </a:bodyPr>
               <a:lstStyle/>
               <a:p>
+                <a:pPr/>
                 <a14:m>
                   <m:oMathPara xmlns:m="http://schemas.openxmlformats.org/officeDocument/2006/math">
                     <m:oMathParaPr>
@@ -12679,7 +14487,7 @@
             </p:txBody>
           </p:sp>
         </mc:Choice>
-        <mc:Fallback>
+        <mc:Fallback xmlns="">
           <p:sp>
             <p:nvSpPr>
               <p:cNvPr id="23" name="TextBox 22"/>
@@ -13601,16 +15409,12 @@
           <a:lstStyle/>
           <a:p>
             <a:r>
-              <a:rPr lang="en-US" i="1" dirty="0" smtClean="0">
+              <a:rPr lang="en-US" i="1" dirty="0">
                 <a:latin typeface="Times New Roman" panose="02020603050405020304" pitchFamily="18" charset="0"/>
                 <a:cs typeface="Times New Roman" panose="02020603050405020304" pitchFamily="18" charset="0"/>
               </a:rPr>
               <a:t>P</a:t>
             </a:r>
-            <a:endParaRPr lang="en-US" i="1" dirty="0">
-              <a:latin typeface="Times New Roman" panose="02020603050405020304" pitchFamily="18" charset="0"/>
-              <a:cs typeface="Times New Roman" panose="02020603050405020304" pitchFamily="18" charset="0"/>
-            </a:endParaRPr>
           </a:p>
         </p:txBody>
       </p:sp>
@@ -13637,16 +15441,12 @@
           <a:lstStyle/>
           <a:p>
             <a:r>
-              <a:rPr lang="en-US" dirty="0" smtClean="0">
+              <a:rPr lang="en-US" dirty="0">
                 <a:latin typeface="Times New Roman" panose="02020603050405020304" pitchFamily="18" charset="0"/>
                 <a:cs typeface="Times New Roman" panose="02020603050405020304" pitchFamily="18" charset="0"/>
               </a:rPr>
               <a:t>(a)</a:t>
             </a:r>
-            <a:endParaRPr lang="en-US" dirty="0">
-              <a:latin typeface="Times New Roman" panose="02020603050405020304" pitchFamily="18" charset="0"/>
-              <a:cs typeface="Times New Roman" panose="02020603050405020304" pitchFamily="18" charset="0"/>
-            </a:endParaRPr>
           </a:p>
         </p:txBody>
       </p:sp>
@@ -13673,16 +15473,12 @@
           <a:lstStyle/>
           <a:p>
             <a:r>
-              <a:rPr lang="en-US" dirty="0" smtClean="0">
+              <a:rPr lang="en-US" dirty="0">
                 <a:latin typeface="Times New Roman" panose="02020603050405020304" pitchFamily="18" charset="0"/>
                 <a:cs typeface="Times New Roman" panose="02020603050405020304" pitchFamily="18" charset="0"/>
               </a:rPr>
               <a:t>(b)</a:t>
             </a:r>
-            <a:endParaRPr lang="en-US" dirty="0">
-              <a:latin typeface="Times New Roman" panose="02020603050405020304" pitchFamily="18" charset="0"/>
-              <a:cs typeface="Times New Roman" panose="02020603050405020304" pitchFamily="18" charset="0"/>
-            </a:endParaRPr>
           </a:p>
         </p:txBody>
       </p:sp>
@@ -13709,16 +15505,12 @@
           <a:lstStyle/>
           <a:p>
             <a:r>
-              <a:rPr lang="en-US" dirty="0" smtClean="0">
+              <a:rPr lang="en-US" dirty="0">
                 <a:latin typeface="Times New Roman" panose="02020603050405020304" pitchFamily="18" charset="0"/>
                 <a:cs typeface="Times New Roman" panose="02020603050405020304" pitchFamily="18" charset="0"/>
               </a:rPr>
               <a:t>(c)</a:t>
             </a:r>
-            <a:endParaRPr lang="en-US" dirty="0">
-              <a:latin typeface="Times New Roman" panose="02020603050405020304" pitchFamily="18" charset="0"/>
-              <a:cs typeface="Times New Roman" panose="02020603050405020304" pitchFamily="18" charset="0"/>
-            </a:endParaRPr>
           </a:p>
         </p:txBody>
       </p:sp>
@@ -13785,16 +15577,12 @@
           <a:lstStyle/>
           <a:p>
             <a:r>
-              <a:rPr lang="en-US" i="1" dirty="0" smtClean="0">
+              <a:rPr lang="en-US" i="1" dirty="0">
                 <a:latin typeface="Times New Roman" panose="02020603050405020304" pitchFamily="18" charset="0"/>
                 <a:cs typeface="Times New Roman" panose="02020603050405020304" pitchFamily="18" charset="0"/>
               </a:rPr>
               <a:t>Q</a:t>
             </a:r>
-            <a:endParaRPr lang="en-US" i="1" dirty="0">
-              <a:latin typeface="Times New Roman" panose="02020603050405020304" pitchFamily="18" charset="0"/>
-              <a:cs typeface="Times New Roman" panose="02020603050405020304" pitchFamily="18" charset="0"/>
-            </a:endParaRPr>
           </a:p>
         </p:txBody>
       </p:sp>
@@ -13932,16 +15720,12 @@
           <a:lstStyle/>
           <a:p>
             <a:r>
-              <a:rPr lang="en-US" i="1" dirty="0" smtClean="0">
+              <a:rPr lang="en-US" i="1" dirty="0">
                 <a:latin typeface="Times New Roman" panose="02020603050405020304" pitchFamily="18" charset="0"/>
                 <a:cs typeface="Times New Roman" panose="02020603050405020304" pitchFamily="18" charset="0"/>
               </a:rPr>
               <a:t>P</a:t>
             </a:r>
-            <a:endParaRPr lang="en-US" i="1" dirty="0">
-              <a:latin typeface="Times New Roman" panose="02020603050405020304" pitchFamily="18" charset="0"/>
-              <a:cs typeface="Times New Roman" panose="02020603050405020304" pitchFamily="18" charset="0"/>
-            </a:endParaRPr>
           </a:p>
         </p:txBody>
       </p:sp>
@@ -14008,16 +15792,12 @@
           <a:lstStyle/>
           <a:p>
             <a:r>
-              <a:rPr lang="en-US" i="1" dirty="0" smtClean="0">
+              <a:rPr lang="en-US" i="1" dirty="0">
                 <a:latin typeface="Times New Roman" panose="02020603050405020304" pitchFamily="18" charset="0"/>
                 <a:cs typeface="Times New Roman" panose="02020603050405020304" pitchFamily="18" charset="0"/>
               </a:rPr>
               <a:t>Q</a:t>
             </a:r>
-            <a:endParaRPr lang="en-US" i="1" dirty="0">
-              <a:latin typeface="Times New Roman" panose="02020603050405020304" pitchFamily="18" charset="0"/>
-              <a:cs typeface="Times New Roman" panose="02020603050405020304" pitchFamily="18" charset="0"/>
-            </a:endParaRPr>
           </a:p>
         </p:txBody>
       </p:sp>
@@ -14198,16 +15978,12 @@
           <a:lstStyle/>
           <a:p>
             <a:r>
-              <a:rPr lang="en-US" i="1" dirty="0" smtClean="0">
+              <a:rPr lang="en-US" i="1" dirty="0">
                 <a:latin typeface="Times New Roman" panose="02020603050405020304" pitchFamily="18" charset="0"/>
                 <a:cs typeface="Times New Roman" panose="02020603050405020304" pitchFamily="18" charset="0"/>
               </a:rPr>
               <a:t>P</a:t>
             </a:r>
-            <a:endParaRPr lang="en-US" i="1" dirty="0">
-              <a:latin typeface="Times New Roman" panose="02020603050405020304" pitchFamily="18" charset="0"/>
-              <a:cs typeface="Times New Roman" panose="02020603050405020304" pitchFamily="18" charset="0"/>
-            </a:endParaRPr>
           </a:p>
         </p:txBody>
       </p:sp>
@@ -14502,16 +16278,12 @@
           <a:lstStyle/>
           <a:p>
             <a:r>
-              <a:rPr lang="en-US" i="1" dirty="0" smtClean="0">
+              <a:rPr lang="en-US" i="1" dirty="0">
                 <a:latin typeface="Times New Roman" panose="02020603050405020304" pitchFamily="18" charset="0"/>
                 <a:cs typeface="Times New Roman" panose="02020603050405020304" pitchFamily="18" charset="0"/>
               </a:rPr>
               <a:t>P</a:t>
             </a:r>
-            <a:endParaRPr lang="en-US" i="1" dirty="0">
-              <a:latin typeface="Times New Roman" panose="02020603050405020304" pitchFamily="18" charset="0"/>
-              <a:cs typeface="Times New Roman" panose="02020603050405020304" pitchFamily="18" charset="0"/>
-            </a:endParaRPr>
           </a:p>
         </p:txBody>
       </p:sp>
@@ -14586,16 +16358,12 @@
           <a:lstStyle/>
           <a:p>
             <a:r>
-              <a:rPr lang="en-US" i="1" dirty="0" smtClean="0">
+              <a:rPr lang="en-US" i="1" dirty="0">
                 <a:latin typeface="Times New Roman" panose="02020603050405020304" pitchFamily="18" charset="0"/>
                 <a:cs typeface="Times New Roman" panose="02020603050405020304" pitchFamily="18" charset="0"/>
               </a:rPr>
               <a:t>Q</a:t>
             </a:r>
-            <a:endParaRPr lang="en-US" i="1" dirty="0">
-              <a:latin typeface="Times New Roman" panose="02020603050405020304" pitchFamily="18" charset="0"/>
-              <a:cs typeface="Times New Roman" panose="02020603050405020304" pitchFamily="18" charset="0"/>
-            </a:endParaRPr>
           </a:p>
         </p:txBody>
       </p:sp>
@@ -15374,16 +17142,12 @@
           <a:lstStyle/>
           <a:p>
             <a:r>
-              <a:rPr lang="en-US" i="1" dirty="0" smtClean="0">
+              <a:rPr lang="en-US" i="1" dirty="0">
                 <a:latin typeface="Times New Roman" panose="02020603050405020304" pitchFamily="18" charset="0"/>
                 <a:cs typeface="Times New Roman" panose="02020603050405020304" pitchFamily="18" charset="0"/>
               </a:rPr>
               <a:t>P</a:t>
             </a:r>
-            <a:endParaRPr lang="en-US" i="1" dirty="0">
-              <a:latin typeface="Times New Roman" panose="02020603050405020304" pitchFamily="18" charset="0"/>
-              <a:cs typeface="Times New Roman" panose="02020603050405020304" pitchFamily="18" charset="0"/>
-            </a:endParaRPr>
           </a:p>
         </p:txBody>
       </p:sp>
@@ -15458,16 +17222,12 @@
           <a:lstStyle/>
           <a:p>
             <a:r>
-              <a:rPr lang="en-US" i="1" dirty="0" smtClean="0">
+              <a:rPr lang="en-US" i="1" dirty="0">
                 <a:latin typeface="Times New Roman" panose="02020603050405020304" pitchFamily="18" charset="0"/>
                 <a:cs typeface="Times New Roman" panose="02020603050405020304" pitchFamily="18" charset="0"/>
               </a:rPr>
               <a:t>Q</a:t>
             </a:r>
-            <a:endParaRPr lang="en-US" i="1" dirty="0">
-              <a:latin typeface="Times New Roman" panose="02020603050405020304" pitchFamily="18" charset="0"/>
-              <a:cs typeface="Times New Roman" panose="02020603050405020304" pitchFamily="18" charset="0"/>
-            </a:endParaRPr>
           </a:p>
         </p:txBody>
       </p:sp>
@@ -16277,16 +18037,12 @@
           <a:lstStyle/>
           <a:p>
             <a:r>
-              <a:rPr lang="en-US" i="1" dirty="0" smtClean="0">
+              <a:rPr lang="en-US" i="1" dirty="0">
                 <a:latin typeface="Times New Roman" panose="02020603050405020304" pitchFamily="18" charset="0"/>
                 <a:cs typeface="Times New Roman" panose="02020603050405020304" pitchFamily="18" charset="0"/>
               </a:rPr>
               <a:t>X</a:t>
             </a:r>
-            <a:endParaRPr lang="en-US" i="1" dirty="0">
-              <a:latin typeface="Times New Roman" panose="02020603050405020304" pitchFamily="18" charset="0"/>
-              <a:cs typeface="Times New Roman" panose="02020603050405020304" pitchFamily="18" charset="0"/>
-            </a:endParaRPr>
           </a:p>
         </p:txBody>
       </p:sp>
@@ -16399,16 +18155,12 @@
           <a:lstStyle/>
           <a:p>
             <a:r>
-              <a:rPr lang="en-US" dirty="0" smtClean="0">
+              <a:rPr lang="en-US" dirty="0">
                 <a:latin typeface="Times New Roman" panose="02020603050405020304" pitchFamily="18" charset="0"/>
                 <a:cs typeface="Times New Roman" panose="02020603050405020304" pitchFamily="18" charset="0"/>
               </a:rPr>
               <a:t>(a)</a:t>
             </a:r>
-            <a:endParaRPr lang="en-US" dirty="0">
-              <a:latin typeface="Times New Roman" panose="02020603050405020304" pitchFamily="18" charset="0"/>
-              <a:cs typeface="Times New Roman" panose="02020603050405020304" pitchFamily="18" charset="0"/>
-            </a:endParaRPr>
           </a:p>
         </p:txBody>
       </p:sp>
@@ -16435,16 +18187,12 @@
           <a:lstStyle/>
           <a:p>
             <a:r>
-              <a:rPr lang="en-US" dirty="0" smtClean="0">
+              <a:rPr lang="en-US" dirty="0">
                 <a:latin typeface="Times New Roman" panose="02020603050405020304" pitchFamily="18" charset="0"/>
                 <a:cs typeface="Times New Roman" panose="02020603050405020304" pitchFamily="18" charset="0"/>
               </a:rPr>
               <a:t>(b)</a:t>
             </a:r>
-            <a:endParaRPr lang="en-US" dirty="0">
-              <a:latin typeface="Times New Roman" panose="02020603050405020304" pitchFamily="18" charset="0"/>
-              <a:cs typeface="Times New Roman" panose="02020603050405020304" pitchFamily="18" charset="0"/>
-            </a:endParaRPr>
           </a:p>
         </p:txBody>
       </p:sp>
@@ -16690,16 +18438,12 @@
             <a:lstStyle/>
             <a:p>
               <a:r>
-                <a:rPr lang="en-US" i="1" smtClean="0">
+                <a:rPr lang="en-US" i="1">
                   <a:latin typeface="Times New Roman" panose="02020603050405020304" pitchFamily="18" charset="0"/>
                   <a:cs typeface="Times New Roman" panose="02020603050405020304" pitchFamily="18" charset="0"/>
                 </a:rPr>
                 <a:t>P</a:t>
               </a:r>
-              <a:endParaRPr lang="en-US" i="1">
-                <a:latin typeface="Times New Roman" panose="02020603050405020304" pitchFamily="18" charset="0"/>
-                <a:cs typeface="Times New Roman" panose="02020603050405020304" pitchFamily="18" charset="0"/>
-              </a:endParaRPr>
             </a:p>
           </p:txBody>
         </p:sp>
@@ -16726,16 +18470,12 @@
             <a:lstStyle/>
             <a:p>
               <a:r>
-                <a:rPr lang="en-US" i="1" dirty="0" smtClean="0">
+                <a:rPr lang="en-US" i="1" dirty="0">
                   <a:latin typeface="Times New Roman" panose="02020603050405020304" pitchFamily="18" charset="0"/>
                   <a:cs typeface="Times New Roman" panose="02020603050405020304" pitchFamily="18" charset="0"/>
                 </a:rPr>
                 <a:t>X</a:t>
               </a:r>
-              <a:endParaRPr lang="en-US" i="1" dirty="0">
-                <a:latin typeface="Times New Roman" panose="02020603050405020304" pitchFamily="18" charset="0"/>
-                <a:cs typeface="Times New Roman" panose="02020603050405020304" pitchFamily="18" charset="0"/>
-              </a:endParaRPr>
             </a:p>
           </p:txBody>
         </p:sp>
@@ -16762,16 +18502,12 @@
             <a:lstStyle/>
             <a:p>
               <a:r>
-                <a:rPr lang="en-US" i="1" dirty="0" smtClean="0">
+                <a:rPr lang="en-US" i="1" dirty="0">
                   <a:latin typeface="Times New Roman" panose="02020603050405020304" pitchFamily="18" charset="0"/>
                   <a:cs typeface="Times New Roman" panose="02020603050405020304" pitchFamily="18" charset="0"/>
                 </a:rPr>
                 <a:t>Y</a:t>
               </a:r>
-              <a:endParaRPr lang="en-US" i="1" dirty="0">
-                <a:latin typeface="Times New Roman" panose="02020603050405020304" pitchFamily="18" charset="0"/>
-                <a:cs typeface="Times New Roman" panose="02020603050405020304" pitchFamily="18" charset="0"/>
-              </a:endParaRPr>
             </a:p>
           </p:txBody>
         </p:sp>
@@ -16834,7 +18570,7 @@
             <a:lstStyle/>
             <a:p>
               <a:r>
-                <a:rPr lang="en-US" i="1" dirty="0" smtClean="0">
+                <a:rPr lang="en-US" i="1" dirty="0">
                   <a:solidFill>
                     <a:schemeClr val="bg1">
                       <a:lumMod val="50000"/>
@@ -16845,15 +18581,6 @@
                 </a:rPr>
                 <a:t>Y’</a:t>
               </a:r>
-              <a:endParaRPr lang="en-US" i="1" dirty="0">
-                <a:solidFill>
-                  <a:schemeClr val="bg1">
-                    <a:lumMod val="50000"/>
-                  </a:schemeClr>
-                </a:solidFill>
-                <a:latin typeface="Times New Roman" panose="02020603050405020304" pitchFamily="18" charset="0"/>
-                <a:cs typeface="Times New Roman" panose="02020603050405020304" pitchFamily="18" charset="0"/>
-              </a:endParaRPr>
             </a:p>
           </p:txBody>
         </p:sp>
@@ -16880,7 +18607,7 @@
             <a:lstStyle/>
             <a:p>
               <a:r>
-                <a:rPr lang="en-US" i="1" dirty="0" smtClean="0">
+                <a:rPr lang="en-US" i="1" dirty="0">
                   <a:solidFill>
                     <a:schemeClr val="bg1">
                       <a:lumMod val="50000"/>
@@ -16891,15 +18618,6 @@
                 </a:rPr>
                 <a:t>X’</a:t>
               </a:r>
-              <a:endParaRPr lang="en-US" i="1" dirty="0">
-                <a:solidFill>
-                  <a:schemeClr val="bg1">
-                    <a:lumMod val="50000"/>
-                  </a:schemeClr>
-                </a:solidFill>
-                <a:latin typeface="Times New Roman" panose="02020603050405020304" pitchFamily="18" charset="0"/>
-                <a:cs typeface="Times New Roman" panose="02020603050405020304" pitchFamily="18" charset="0"/>
-              </a:endParaRPr>
             </a:p>
           </p:txBody>
         </p:sp>
@@ -17157,16 +18875,12 @@
             <a:lstStyle/>
             <a:p>
               <a:r>
-                <a:rPr lang="en-US" i="1" dirty="0" smtClean="0">
+                <a:rPr lang="en-US" i="1" dirty="0">
                   <a:latin typeface="Times New Roman" panose="02020603050405020304" pitchFamily="18" charset="0"/>
                   <a:cs typeface="Times New Roman" panose="02020603050405020304" pitchFamily="18" charset="0"/>
                 </a:rPr>
                 <a:t>P’</a:t>
               </a:r>
-              <a:endParaRPr lang="en-US" i="1" dirty="0">
-                <a:latin typeface="Times New Roman" panose="02020603050405020304" pitchFamily="18" charset="0"/>
-                <a:cs typeface="Times New Roman" panose="02020603050405020304" pitchFamily="18" charset="0"/>
-              </a:endParaRPr>
             </a:p>
           </p:txBody>
         </p:sp>
@@ -17323,7 +19037,7 @@
                       </m:oMath>
                     </m:oMathPara>
                   </a14:m>
-                  <a:endParaRPr lang="en-US" b="0" i="1" dirty="0" smtClean="0">
+                  <a:endParaRPr lang="en-US" b="0" i="1" dirty="0">
                     <a:latin typeface="Times New Roman" panose="02020603050405020304" pitchFamily="18" charset="0"/>
                     <a:cs typeface="Times New Roman" panose="02020603050405020304" pitchFamily="18" charset="0"/>
                   </a:endParaRPr>
@@ -17801,16 +19515,12 @@
             <a:lstStyle/>
             <a:p>
               <a:r>
-                <a:rPr lang="en-US" i="1" smtClean="0">
+                <a:rPr lang="en-US" i="1">
                   <a:latin typeface="Times New Roman" panose="02020603050405020304" pitchFamily="18" charset="0"/>
                   <a:cs typeface="Times New Roman" panose="02020603050405020304" pitchFamily="18" charset="0"/>
                 </a:rPr>
                 <a:t>P</a:t>
               </a:r>
-              <a:endParaRPr lang="en-US" i="1">
-                <a:latin typeface="Times New Roman" panose="02020603050405020304" pitchFamily="18" charset="0"/>
-                <a:cs typeface="Times New Roman" panose="02020603050405020304" pitchFamily="18" charset="0"/>
-              </a:endParaRPr>
             </a:p>
           </p:txBody>
         </p:sp>
@@ -17837,7 +19547,7 @@
             <a:lstStyle/>
             <a:p>
               <a:r>
-                <a:rPr lang="en-US" i="1" dirty="0" smtClean="0">
+                <a:rPr lang="en-US" i="1" dirty="0">
                   <a:solidFill>
                     <a:schemeClr val="bg1">
                       <a:lumMod val="50000"/>
@@ -17848,15 +19558,6 @@
                 </a:rPr>
                 <a:t>X</a:t>
               </a:r>
-              <a:endParaRPr lang="en-US" i="1" dirty="0">
-                <a:solidFill>
-                  <a:schemeClr val="bg1">
-                    <a:lumMod val="50000"/>
-                  </a:schemeClr>
-                </a:solidFill>
-                <a:latin typeface="Times New Roman" panose="02020603050405020304" pitchFamily="18" charset="0"/>
-                <a:cs typeface="Times New Roman" panose="02020603050405020304" pitchFamily="18" charset="0"/>
-              </a:endParaRPr>
             </a:p>
           </p:txBody>
         </p:sp>
@@ -17883,7 +19584,7 @@
             <a:lstStyle/>
             <a:p>
               <a:r>
-                <a:rPr lang="en-US" i="1" dirty="0" smtClean="0">
+                <a:rPr lang="en-US" i="1" dirty="0">
                   <a:solidFill>
                     <a:schemeClr val="bg1">
                       <a:lumMod val="50000"/>
@@ -17894,15 +19595,6 @@
                 </a:rPr>
                 <a:t>Y</a:t>
               </a:r>
-              <a:endParaRPr lang="en-US" i="1" dirty="0">
-                <a:solidFill>
-                  <a:schemeClr val="bg1">
-                    <a:lumMod val="50000"/>
-                  </a:schemeClr>
-                </a:solidFill>
-                <a:latin typeface="Times New Roman" panose="02020603050405020304" pitchFamily="18" charset="0"/>
-                <a:cs typeface="Times New Roman" panose="02020603050405020304" pitchFamily="18" charset="0"/>
-              </a:endParaRPr>
             </a:p>
           </p:txBody>
         </p:sp>
@@ -17969,16 +19661,12 @@
             <a:lstStyle/>
             <a:p>
               <a:r>
-                <a:rPr lang="en-US" i="1" dirty="0" smtClean="0">
+                <a:rPr lang="en-US" i="1" dirty="0">
                   <a:latin typeface="Times New Roman" panose="02020603050405020304" pitchFamily="18" charset="0"/>
                   <a:cs typeface="Times New Roman" panose="02020603050405020304" pitchFamily="18" charset="0"/>
                 </a:rPr>
                 <a:t>Y’</a:t>
               </a:r>
-              <a:endParaRPr lang="en-US" i="1" dirty="0">
-                <a:latin typeface="Times New Roman" panose="02020603050405020304" pitchFamily="18" charset="0"/>
-                <a:cs typeface="Times New Roman" panose="02020603050405020304" pitchFamily="18" charset="0"/>
-              </a:endParaRPr>
             </a:p>
           </p:txBody>
         </p:sp>
@@ -18005,16 +19693,12 @@
             <a:lstStyle/>
             <a:p>
               <a:r>
-                <a:rPr lang="en-US" i="1" dirty="0" smtClean="0">
+                <a:rPr lang="en-US" i="1" dirty="0">
                   <a:latin typeface="Times New Roman" panose="02020603050405020304" pitchFamily="18" charset="0"/>
                   <a:cs typeface="Times New Roman" panose="02020603050405020304" pitchFamily="18" charset="0"/>
                 </a:rPr>
                 <a:t>X’</a:t>
               </a:r>
-              <a:endParaRPr lang="en-US" i="1" dirty="0">
-                <a:latin typeface="Times New Roman" panose="02020603050405020304" pitchFamily="18" charset="0"/>
-                <a:cs typeface="Times New Roman" panose="02020603050405020304" pitchFamily="18" charset="0"/>
-              </a:endParaRPr>
             </a:p>
           </p:txBody>
         </p:sp>
@@ -18358,16 +20042,12 @@
             <a:lstStyle/>
             <a:p>
               <a:r>
-                <a:rPr lang="en-US" i="1" dirty="0" smtClean="0">
+                <a:rPr lang="en-US" i="1" dirty="0">
                   <a:latin typeface="Times New Roman" panose="02020603050405020304" pitchFamily="18" charset="0"/>
                   <a:cs typeface="Times New Roman" panose="02020603050405020304" pitchFamily="18" charset="0"/>
                 </a:rPr>
                 <a:t>P’</a:t>
               </a:r>
-              <a:endParaRPr lang="en-US" i="1" dirty="0">
-                <a:latin typeface="Times New Roman" panose="02020603050405020304" pitchFamily="18" charset="0"/>
-                <a:cs typeface="Times New Roman" panose="02020603050405020304" pitchFamily="18" charset="0"/>
-              </a:endParaRPr>
             </a:p>
           </p:txBody>
         </p:sp>
@@ -18574,7 +20254,7 @@
                       </m:oMath>
                     </m:oMathPara>
                   </a14:m>
-                  <a:endParaRPr lang="en-US" b="0" i="1" dirty="0" smtClean="0">
+                  <a:endParaRPr lang="en-US" b="0" i="1" dirty="0">
                     <a:latin typeface="Times New Roman" panose="02020603050405020304" pitchFamily="18" charset="0"/>
                     <a:cs typeface="Times New Roman" panose="02020603050405020304" pitchFamily="18" charset="0"/>
                   </a:endParaRPr>
@@ -21561,16 +23241,12 @@
           <a:lstStyle/>
           <a:p>
             <a:r>
-              <a:rPr lang="en-US" dirty="0" smtClean="0">
+              <a:rPr lang="en-US" dirty="0">
                 <a:latin typeface="Times New Roman" panose="02020603050405020304" pitchFamily="18" charset="0"/>
                 <a:cs typeface="Times New Roman" panose="02020603050405020304" pitchFamily="18" charset="0"/>
               </a:rPr>
               <a:t>(a)</a:t>
             </a:r>
-            <a:endParaRPr lang="en-US" dirty="0">
-              <a:latin typeface="Times New Roman" panose="02020603050405020304" pitchFamily="18" charset="0"/>
-              <a:cs typeface="Times New Roman" panose="02020603050405020304" pitchFamily="18" charset="0"/>
-            </a:endParaRPr>
           </a:p>
         </p:txBody>
       </p:sp>
@@ -21597,16 +23273,12 @@
           <a:lstStyle/>
           <a:p>
             <a:r>
-              <a:rPr lang="en-US" dirty="0" smtClean="0">
+              <a:rPr lang="en-US" dirty="0">
                 <a:latin typeface="Times New Roman" panose="02020603050405020304" pitchFamily="18" charset="0"/>
                 <a:cs typeface="Times New Roman" panose="02020603050405020304" pitchFamily="18" charset="0"/>
               </a:rPr>
               <a:t>(b)</a:t>
             </a:r>
-            <a:endParaRPr lang="en-US" dirty="0">
-              <a:latin typeface="Times New Roman" panose="02020603050405020304" pitchFamily="18" charset="0"/>
-              <a:cs typeface="Times New Roman" panose="02020603050405020304" pitchFamily="18" charset="0"/>
-            </a:endParaRPr>
           </a:p>
         </p:txBody>
       </p:sp>
@@ -21633,16 +23305,12 @@
           <a:lstStyle/>
           <a:p>
             <a:r>
-              <a:rPr lang="en-US" dirty="0" smtClean="0">
+              <a:rPr lang="en-US" dirty="0">
                 <a:latin typeface="Times New Roman" panose="02020603050405020304" pitchFamily="18" charset="0"/>
                 <a:cs typeface="Times New Roman" panose="02020603050405020304" pitchFamily="18" charset="0"/>
               </a:rPr>
               <a:t>(c)</a:t>
             </a:r>
-            <a:endParaRPr lang="en-US" dirty="0">
-              <a:latin typeface="Times New Roman" panose="02020603050405020304" pitchFamily="18" charset="0"/>
-              <a:cs typeface="Times New Roman" panose="02020603050405020304" pitchFamily="18" charset="0"/>
-            </a:endParaRPr>
           </a:p>
         </p:txBody>
       </p:sp>
@@ -21669,16 +23337,12 @@
           <a:lstStyle/>
           <a:p>
             <a:r>
-              <a:rPr lang="en-US" dirty="0" smtClean="0">
+              <a:rPr lang="en-US" dirty="0">
                 <a:latin typeface="Times New Roman" panose="02020603050405020304" pitchFamily="18" charset="0"/>
                 <a:cs typeface="Times New Roman" panose="02020603050405020304" pitchFamily="18" charset="0"/>
               </a:rPr>
               <a:t>(d)</a:t>
             </a:r>
-            <a:endParaRPr lang="en-US" dirty="0">
-              <a:latin typeface="Times New Roman" panose="02020603050405020304" pitchFamily="18" charset="0"/>
-              <a:cs typeface="Times New Roman" panose="02020603050405020304" pitchFamily="18" charset="0"/>
-            </a:endParaRPr>
           </a:p>
         </p:txBody>
       </p:sp>
@@ -23295,16 +24959,12 @@
           <a:lstStyle/>
           <a:p>
             <a:r>
-              <a:rPr lang="en-US" dirty="0" smtClean="0">
+              <a:rPr lang="en-US" dirty="0">
                 <a:latin typeface="Times New Roman" panose="02020603050405020304" pitchFamily="18" charset="0"/>
                 <a:cs typeface="Times New Roman" panose="02020603050405020304" pitchFamily="18" charset="0"/>
               </a:rPr>
               <a:t>(e)</a:t>
             </a:r>
-            <a:endParaRPr lang="en-US" dirty="0">
-              <a:latin typeface="Times New Roman" panose="02020603050405020304" pitchFamily="18" charset="0"/>
-              <a:cs typeface="Times New Roman" panose="02020603050405020304" pitchFamily="18" charset="0"/>
-            </a:endParaRPr>
           </a:p>
         </p:txBody>
       </p:sp>
@@ -23544,16 +25204,12 @@
           <a:lstStyle/>
           <a:p>
             <a:r>
-              <a:rPr lang="en-US" i="1" smtClean="0">
+              <a:rPr lang="en-US" i="1">
                 <a:latin typeface="Times New Roman" panose="02020603050405020304" pitchFamily="18" charset="0"/>
                 <a:cs typeface="Times New Roman" panose="02020603050405020304" pitchFamily="18" charset="0"/>
               </a:rPr>
               <a:t>P</a:t>
             </a:r>
-            <a:endParaRPr lang="en-US" i="1">
-              <a:latin typeface="Times New Roman" panose="02020603050405020304" pitchFamily="18" charset="0"/>
-              <a:cs typeface="Times New Roman" panose="02020603050405020304" pitchFamily="18" charset="0"/>
-            </a:endParaRPr>
           </a:p>
         </p:txBody>
       </p:sp>
@@ -23580,7 +25236,7 @@
           <a:lstStyle/>
           <a:p>
             <a:r>
-              <a:rPr lang="en-US" i="1" dirty="0" smtClean="0">
+              <a:rPr lang="en-US" i="1" dirty="0">
                 <a:solidFill>
                   <a:schemeClr val="bg1">
                     <a:lumMod val="50000"/>
@@ -23591,15 +25247,6 @@
               </a:rPr>
               <a:t>O</a:t>
             </a:r>
-            <a:endParaRPr lang="en-US" i="1" dirty="0">
-              <a:solidFill>
-                <a:schemeClr val="bg1">
-                  <a:lumMod val="50000"/>
-                </a:schemeClr>
-              </a:solidFill>
-              <a:latin typeface="Times New Roman" panose="02020603050405020304" pitchFamily="18" charset="0"/>
-              <a:cs typeface="Times New Roman" panose="02020603050405020304" pitchFamily="18" charset="0"/>
-            </a:endParaRPr>
           </a:p>
         </p:txBody>
       </p:sp>
@@ -23626,7 +25273,7 @@
           <a:lstStyle/>
           <a:p>
             <a:r>
-              <a:rPr lang="en-US" i="1" dirty="0" smtClean="0">
+              <a:rPr lang="en-US" i="1" dirty="0">
                 <a:solidFill>
                   <a:schemeClr val="bg1">
                     <a:lumMod val="50000"/>
@@ -23637,15 +25284,6 @@
               </a:rPr>
               <a:t>X</a:t>
             </a:r>
-            <a:endParaRPr lang="en-US" i="1" dirty="0">
-              <a:solidFill>
-                <a:schemeClr val="bg1">
-                  <a:lumMod val="50000"/>
-                </a:schemeClr>
-              </a:solidFill>
-              <a:latin typeface="Times New Roman" panose="02020603050405020304" pitchFamily="18" charset="0"/>
-              <a:cs typeface="Times New Roman" panose="02020603050405020304" pitchFamily="18" charset="0"/>
-            </a:endParaRPr>
           </a:p>
         </p:txBody>
       </p:sp>
@@ -23672,7 +25310,7 @@
           <a:lstStyle/>
           <a:p>
             <a:r>
-              <a:rPr lang="en-US" i="1" dirty="0" smtClean="0">
+              <a:rPr lang="en-US" i="1" dirty="0">
                 <a:solidFill>
                   <a:schemeClr val="bg1">
                     <a:lumMod val="50000"/>
@@ -23683,15 +25321,6 @@
               </a:rPr>
               <a:t>Y</a:t>
             </a:r>
-            <a:endParaRPr lang="en-US" i="1" dirty="0">
-              <a:solidFill>
-                <a:schemeClr val="bg1">
-                  <a:lumMod val="50000"/>
-                </a:schemeClr>
-              </a:solidFill>
-              <a:latin typeface="Times New Roman" panose="02020603050405020304" pitchFamily="18" charset="0"/>
-              <a:cs typeface="Times New Roman" panose="02020603050405020304" pitchFamily="18" charset="0"/>
-            </a:endParaRPr>
           </a:p>
         </p:txBody>
       </p:sp>
@@ -23758,16 +25387,12 @@
           <a:lstStyle/>
           <a:p>
             <a:r>
-              <a:rPr lang="en-US" i="1" dirty="0" smtClean="0">
+              <a:rPr lang="en-US" i="1" dirty="0">
                 <a:latin typeface="Times New Roman" panose="02020603050405020304" pitchFamily="18" charset="0"/>
                 <a:cs typeface="Times New Roman" panose="02020603050405020304" pitchFamily="18" charset="0"/>
               </a:rPr>
               <a:t>O’</a:t>
             </a:r>
-            <a:endParaRPr lang="en-US" i="1" dirty="0">
-              <a:latin typeface="Times New Roman" panose="02020603050405020304" pitchFamily="18" charset="0"/>
-              <a:cs typeface="Times New Roman" panose="02020603050405020304" pitchFamily="18" charset="0"/>
-            </a:endParaRPr>
           </a:p>
         </p:txBody>
       </p:sp>
@@ -23794,16 +25419,12 @@
           <a:lstStyle/>
           <a:p>
             <a:r>
-              <a:rPr lang="en-US" i="1" dirty="0" smtClean="0">
+              <a:rPr lang="en-US" i="1" dirty="0">
                 <a:latin typeface="Times New Roman" panose="02020603050405020304" pitchFamily="18" charset="0"/>
                 <a:cs typeface="Times New Roman" panose="02020603050405020304" pitchFamily="18" charset="0"/>
               </a:rPr>
               <a:t>Y’</a:t>
             </a:r>
-            <a:endParaRPr lang="en-US" i="1" dirty="0">
-              <a:latin typeface="Times New Roman" panose="02020603050405020304" pitchFamily="18" charset="0"/>
-              <a:cs typeface="Times New Roman" panose="02020603050405020304" pitchFamily="18" charset="0"/>
-            </a:endParaRPr>
           </a:p>
         </p:txBody>
       </p:sp>
@@ -23830,16 +25451,12 @@
           <a:lstStyle/>
           <a:p>
             <a:r>
-              <a:rPr lang="en-US" i="1" dirty="0" smtClean="0">
+              <a:rPr lang="en-US" i="1" dirty="0">
                 <a:latin typeface="Times New Roman" panose="02020603050405020304" pitchFamily="18" charset="0"/>
                 <a:cs typeface="Times New Roman" panose="02020603050405020304" pitchFamily="18" charset="0"/>
               </a:rPr>
               <a:t>X’</a:t>
             </a:r>
-            <a:endParaRPr lang="en-US" i="1" dirty="0">
-              <a:latin typeface="Times New Roman" panose="02020603050405020304" pitchFamily="18" charset="0"/>
-              <a:cs typeface="Times New Roman" panose="02020603050405020304" pitchFamily="18" charset="0"/>
-            </a:endParaRPr>
           </a:p>
         </p:txBody>
       </p:sp>
@@ -24020,7 +25637,7 @@
                     </m:oMath>
                   </m:oMathPara>
                 </a14:m>
-                <a:endParaRPr lang="en-US" b="0" i="1" dirty="0" smtClean="0">
+                <a:endParaRPr lang="en-US" b="0" i="1" dirty="0">
                   <a:latin typeface="Times New Roman" panose="02020603050405020304" pitchFamily="18" charset="0"/>
                   <a:cs typeface="Times New Roman" panose="02020603050405020304" pitchFamily="18" charset="0"/>
                 </a:endParaRPr>
@@ -24271,7 +25888,7 @@
                     </m:oMath>
                   </m:oMathPara>
                 </a14:m>
-                <a:endParaRPr lang="en-US" b="0" i="1" dirty="0" smtClean="0">
+                <a:endParaRPr lang="en-US" b="0" i="1" dirty="0">
                   <a:latin typeface="Times New Roman" panose="02020603050405020304" pitchFamily="18" charset="0"/>
                   <a:cs typeface="Times New Roman" panose="02020603050405020304" pitchFamily="18" charset="0"/>
                 </a:endParaRPr>
@@ -24745,16 +26362,12 @@
               </a:spcBef>
             </a:pPr>
             <a:r>
-              <a:rPr lang="en-US" dirty="0" smtClean="0">
+              <a:rPr lang="en-US" dirty="0">
                 <a:latin typeface="Times New Roman" panose="02020603050405020304" pitchFamily="18" charset="0"/>
                 <a:cs typeface="Times New Roman" panose="02020603050405020304" pitchFamily="18" charset="0"/>
               </a:rPr>
               <a:t>(1,0,0)</a:t>
             </a:r>
-            <a:endParaRPr lang="en-US" dirty="0">
-              <a:latin typeface="Times New Roman" panose="02020603050405020304" pitchFamily="18" charset="0"/>
-              <a:cs typeface="Times New Roman" panose="02020603050405020304" pitchFamily="18" charset="0"/>
-            </a:endParaRPr>
           </a:p>
         </p:txBody>
       </p:sp>
@@ -28357,16 +29970,12 @@
           <a:lstStyle/>
           <a:p>
             <a:r>
-              <a:rPr lang="en-US" i="1" dirty="0" smtClean="0">
+              <a:rPr lang="en-US" i="1" dirty="0">
                 <a:latin typeface="Times New Roman" panose="02020603050405020304" pitchFamily="18" charset="0"/>
                 <a:cs typeface="Times New Roman" panose="02020603050405020304" pitchFamily="18" charset="0"/>
               </a:rPr>
               <a:t>P</a:t>
             </a:r>
-            <a:endParaRPr lang="en-US" i="1" dirty="0">
-              <a:latin typeface="Times New Roman" panose="02020603050405020304" pitchFamily="18" charset="0"/>
-              <a:cs typeface="Times New Roman" panose="02020603050405020304" pitchFamily="18" charset="0"/>
-            </a:endParaRPr>
           </a:p>
         </p:txBody>
       </p:sp>
@@ -28393,16 +30002,12 @@
           <a:lstStyle/>
           <a:p>
             <a:r>
-              <a:rPr lang="en-US" i="1" dirty="0" smtClean="0">
+              <a:rPr lang="en-US" i="1" dirty="0">
                 <a:latin typeface="Times New Roman" panose="02020603050405020304" pitchFamily="18" charset="0"/>
                 <a:cs typeface="Times New Roman" panose="02020603050405020304" pitchFamily="18" charset="0"/>
               </a:rPr>
               <a:t>P’</a:t>
             </a:r>
-            <a:endParaRPr lang="en-US" i="1" dirty="0">
-              <a:latin typeface="Times New Roman" panose="02020603050405020304" pitchFamily="18" charset="0"/>
-              <a:cs typeface="Times New Roman" panose="02020603050405020304" pitchFamily="18" charset="0"/>
-            </a:endParaRPr>
           </a:p>
         </p:txBody>
       </p:sp>

</xml_diff>